<commit_message>
Updated materials for course
</commit_message>
<xml_diff>
--- a/notebooks/Cross-Validation/Model_Fitting_Dealing_With_Uncertainty.pptx
+++ b/notebooks/Cross-Validation/Model_Fitting_Dealing_With_Uncertainty.pptx
@@ -1,8 +1,8 @@
 
 <file path=ppt/presentation.xml><?xml version="1.0" encoding="utf-8"?>
-<p:presentation xmlns:a="http://schemas.openxmlformats.org/drawingml/2006/main" xmlns:r="http://schemas.openxmlformats.org/officeDocument/2006/relationships" xmlns:mc="http://schemas.openxmlformats.org/markup-compatibility/2006" xmlns:mv="urn:schemas-microsoft-com:mac:vml" xmlns:p="http://schemas.openxmlformats.org/presentationml/2006/main" xmlns:c="http://schemas.openxmlformats.org/drawingml/2006/chart" xmlns:dgm="http://schemas.openxmlformats.org/drawingml/2006/diagram" xmlns:o="urn:schemas-microsoft-com:office:office" xmlns:v="urn:schemas-microsoft-com:vml" xmlns:pvml="urn:schemas-microsoft-com:office:powerpoint" xmlns:com="http://schemas.openxmlformats.org/drawingml/2006/compatibility" xmlns:p14="http://schemas.microsoft.com/office/powerpoint/2010/main" xmlns:p15="http://schemas.microsoft.com/office/powerpoint/2012/main" xmlns:ahyp="http://schemas.microsoft.com/office/drawing/2018/hyperlinkcolor" autoCompressPictures="0" strictFirstAndLastChars="0" saveSubsetFonts="1" showSpecialPlsOnTitleSld="0">
+<p:presentation xmlns:a="http://schemas.openxmlformats.org/drawingml/2006/main" xmlns:r="http://schemas.openxmlformats.org/officeDocument/2006/relationships" xmlns:mc="http://schemas.openxmlformats.org/markup-compatibility/2006" xmlns:mv="urn:schemas-microsoft-com:mac:vml" xmlns:p="http://schemas.openxmlformats.org/presentationml/2006/main" xmlns:c="http://schemas.openxmlformats.org/drawingml/2006/chart" xmlns:dgm="http://schemas.openxmlformats.org/drawingml/2006/diagram" xmlns:o="urn:schemas-microsoft-com:office:office" xmlns:v="urn:schemas-microsoft-com:vml" xmlns:pvml="urn:schemas-microsoft-com:office:powerpoint" xmlns:com="http://schemas.openxmlformats.org/drawingml/2006/compatibility" xmlns:p14="http://schemas.microsoft.com/office/powerpoint/2010/main" xmlns:p15="http://schemas.microsoft.com/office/powerpoint/2012/main" xmlns:ahyp="http://schemas.microsoft.com/office/drawing/2018/hyperlinkcolor" autoCompressPictures="0" embedTrueTypeFonts="1" strictFirstAndLastChars="0" saveSubsetFonts="1" showSpecialPlsOnTitleSld="0">
   <p:sldMasterIdLst>
-    <p:sldMasterId id="2147483659" r:id="rId5"/>
+    <p:sldMasterId id="2147483660" r:id="rId5"/>
   </p:sldMasterIdLst>
   <p:notesMasterIdLst>
     <p:notesMasterId r:id="rId6"/>
@@ -21,6 +21,13 @@
   </p:sldIdLst>
   <p:sldSz cy="6858000" cx="9144000"/>
   <p:notesSz cx="6858000" cy="9144000"/>
+  <p:embeddedFontLst>
+    <p:embeddedFont>
+      <p:font typeface="Encode Sans Condensed Thin"/>
+      <p:regular r:id="rId17"/>
+      <p:bold r:id="rId18"/>
+    </p:embeddedFont>
+  </p:embeddedFontLst>
   <p:defaultTextStyle>
     <a:defPPr lvl="0" marR="0" rtl="0" algn="l">
       <a:lnSpc>
@@ -1442,7 +1449,7 @@
   <p:cSld>
     <p:spTree>
       <p:nvGrpSpPr>
-        <p:cNvPr id="88" name="Shape 88"/>
+        <p:cNvPr id="94" name="Shape 94"/>
         <p:cNvGrpSpPr/>
         <p:nvPr/>
       </p:nvGrpSpPr>
@@ -1456,7 +1463,7 @@
       </p:grpSpPr>
       <p:sp>
         <p:nvSpPr>
-          <p:cNvPr id="89" name="Google Shape;89;p1:notes"/>
+          <p:cNvPr id="95" name="Google Shape;95;ge4ca351a5c_0_0:notes"/>
           <p:cNvSpPr/>
           <p:nvPr>
             <p:ph idx="2" type="sldImg"/>
@@ -1464,8 +1471,8 @@
         </p:nvSpPr>
         <p:spPr>
           <a:xfrm>
-            <a:off x="1143000" y="685800"/>
-            <a:ext cx="4572000" cy="3429000"/>
+            <a:off x="1371600" y="1143000"/>
+            <a:ext cx="4114800" cy="3086100"/>
           </a:xfrm>
           <a:custGeom>
             <a:rect b="b" l="l" r="r" t="t"/>
@@ -1501,7 +1508,7 @@
       </p:sp>
       <p:sp>
         <p:nvSpPr>
-          <p:cNvPr id="90" name="Google Shape;90;p1:notes"/>
+          <p:cNvPr id="96" name="Google Shape;96;ge4ca351a5c_0_0:notes"/>
           <p:cNvSpPr txBox="1"/>
           <p:nvPr>
             <p:ph idx="1" type="body"/>
@@ -1509,8 +1516,8 @@
         </p:nvSpPr>
         <p:spPr>
           <a:xfrm>
-            <a:off x="685800" y="4343400"/>
-            <a:ext cx="5486400" cy="4114800"/>
+            <a:off x="685800" y="4400550"/>
+            <a:ext cx="5486400" cy="3600600"/>
           </a:xfrm>
           <a:prstGeom prst="rect">
             <a:avLst/>
@@ -1527,24 +1534,36 @@
           <a:lstStyle/>
           <a:p>
             <a:pPr indent="0" lvl="0" marL="0" rtl="0" algn="l">
-              <a:spcBef>
-                <a:spcPts val="0"/>
-              </a:spcBef>
-              <a:spcAft>
-                <a:spcPts val="0"/>
-              </a:spcAft>
+              <a:lnSpc>
+                <a:spcPct val="100000"/>
+              </a:lnSpc>
+              <a:spcBef>
+                <a:spcPts val="0"/>
+              </a:spcBef>
+              <a:spcAft>
+                <a:spcPts val="0"/>
+              </a:spcAft>
+              <a:buSzPts val="1400"/>
               <a:buNone/>
             </a:pPr>
             <a:r>
               <a:t/>
             </a:r>
-            <a:endParaRPr/>
+            <a:endParaRPr sz="1200">
+              <a:solidFill>
+                <a:schemeClr val="lt1"/>
+              </a:solidFill>
+              <a:latin typeface="Calibri"/>
+              <a:ea typeface="Calibri"/>
+              <a:cs typeface="Calibri"/>
+              <a:sym typeface="Calibri"/>
+            </a:endParaRPr>
           </a:p>
         </p:txBody>
       </p:sp>
       <p:sp>
         <p:nvSpPr>
-          <p:cNvPr id="91" name="Google Shape;91;p1:notes"/>
+          <p:cNvPr id="97" name="Google Shape;97;ge4ca351a5c_0_0:notes"/>
           <p:cNvSpPr txBox="1"/>
           <p:nvPr>
             <p:ph idx="12" type="sldNum"/>
@@ -1553,7 +1572,7 @@
         <p:spPr>
           <a:xfrm>
             <a:off x="3884613" y="8685213"/>
-            <a:ext cx="2971800" cy="457200"/>
+            <a:ext cx="2971800" cy="458700"/>
           </a:xfrm>
           <a:prstGeom prst="rect">
             <a:avLst/>
@@ -1570,12 +1589,16 @@
           <a:lstStyle/>
           <a:p>
             <a:pPr indent="0" lvl="0" marL="0" rtl="0" algn="r">
-              <a:spcBef>
-                <a:spcPts val="0"/>
-              </a:spcBef>
-              <a:spcAft>
-                <a:spcPts val="0"/>
-              </a:spcAft>
+              <a:lnSpc>
+                <a:spcPct val="100000"/>
+              </a:lnSpc>
+              <a:spcBef>
+                <a:spcPts val="0"/>
+              </a:spcBef>
+              <a:spcAft>
+                <a:spcPts val="0"/>
+              </a:spcAft>
+              <a:buSzPts val="1400"/>
               <a:buNone/>
             </a:pPr>
             <a:fld id="{00000000-1234-1234-1234-123412341234}" type="slidenum">
@@ -1599,7 +1622,7 @@
   <p:cSld>
     <p:spTree>
       <p:nvGrpSpPr>
-        <p:cNvPr id="259" name="Shape 259"/>
+        <p:cNvPr id="269" name="Shape 269"/>
         <p:cNvGrpSpPr/>
         <p:nvPr/>
       </p:nvGrpSpPr>
@@ -1613,7 +1636,7 @@
       </p:grpSpPr>
       <p:sp>
         <p:nvSpPr>
-          <p:cNvPr id="260" name="Google Shape;260;p10:notes"/>
+          <p:cNvPr id="270" name="Google Shape;270;p10:notes"/>
           <p:cNvSpPr txBox="1"/>
           <p:nvPr>
             <p:ph idx="1" type="body"/>
@@ -1652,7 +1675,7 @@
       </p:sp>
       <p:sp>
         <p:nvSpPr>
-          <p:cNvPr id="261" name="Google Shape;261;p10:notes"/>
+          <p:cNvPr id="271" name="Google Shape;271;p10:notes"/>
           <p:cNvSpPr/>
           <p:nvPr>
             <p:ph idx="2" type="sldImg"/>
@@ -1698,7 +1721,7 @@
   <p:cSld>
     <p:spTree>
       <p:nvGrpSpPr>
-        <p:cNvPr id="95" name="Shape 95"/>
+        <p:cNvPr id="105" name="Shape 105"/>
         <p:cNvGrpSpPr/>
         <p:nvPr/>
       </p:nvGrpSpPr>
@@ -1712,7 +1735,7 @@
       </p:grpSpPr>
       <p:sp>
         <p:nvSpPr>
-          <p:cNvPr id="96" name="Google Shape;96;p2:notes"/>
+          <p:cNvPr id="106" name="Google Shape;106;p2:notes"/>
           <p:cNvSpPr txBox="1"/>
           <p:nvPr>
             <p:ph idx="1" type="body"/>
@@ -1751,7 +1774,7 @@
       </p:sp>
       <p:sp>
         <p:nvSpPr>
-          <p:cNvPr id="97" name="Google Shape;97;p2:notes"/>
+          <p:cNvPr id="107" name="Google Shape;107;p2:notes"/>
           <p:cNvSpPr/>
           <p:nvPr>
             <p:ph idx="2" type="sldImg"/>
@@ -1797,7 +1820,7 @@
   <p:cSld>
     <p:spTree>
       <p:nvGrpSpPr>
-        <p:cNvPr id="102" name="Shape 102"/>
+        <p:cNvPr id="112" name="Shape 112"/>
         <p:cNvGrpSpPr/>
         <p:nvPr/>
       </p:nvGrpSpPr>
@@ -1811,7 +1834,7 @@
       </p:grpSpPr>
       <p:sp>
         <p:nvSpPr>
-          <p:cNvPr id="103" name="Google Shape;103;p3:notes"/>
+          <p:cNvPr id="113" name="Google Shape;113;p3:notes"/>
           <p:cNvSpPr txBox="1"/>
           <p:nvPr>
             <p:ph idx="1" type="body"/>
@@ -1850,7 +1873,7 @@
       </p:sp>
       <p:sp>
         <p:nvSpPr>
-          <p:cNvPr id="104" name="Google Shape;104;p3:notes"/>
+          <p:cNvPr id="114" name="Google Shape;114;p3:notes"/>
           <p:cNvSpPr/>
           <p:nvPr>
             <p:ph idx="2" type="sldImg"/>
@@ -1896,7 +1919,7 @@
   <p:cSld>
     <p:spTree>
       <p:nvGrpSpPr>
-        <p:cNvPr id="136" name="Shape 136"/>
+        <p:cNvPr id="146" name="Shape 146"/>
         <p:cNvGrpSpPr/>
         <p:nvPr/>
       </p:nvGrpSpPr>
@@ -1910,7 +1933,7 @@
       </p:grpSpPr>
       <p:sp>
         <p:nvSpPr>
-          <p:cNvPr id="137" name="Google Shape;137;p4:notes"/>
+          <p:cNvPr id="147" name="Google Shape;147;p4:notes"/>
           <p:cNvSpPr txBox="1"/>
           <p:nvPr>
             <p:ph idx="1" type="body"/>
@@ -1949,7 +1972,7 @@
       </p:sp>
       <p:sp>
         <p:nvSpPr>
-          <p:cNvPr id="138" name="Google Shape;138;p4:notes"/>
+          <p:cNvPr id="148" name="Google Shape;148;p4:notes"/>
           <p:cNvSpPr/>
           <p:nvPr>
             <p:ph idx="2" type="sldImg"/>
@@ -1995,7 +2018,7 @@
   <p:cSld>
     <p:spTree>
       <p:nvGrpSpPr>
-        <p:cNvPr id="143" name="Shape 143"/>
+        <p:cNvPr id="153" name="Shape 153"/>
         <p:cNvGrpSpPr/>
         <p:nvPr/>
       </p:nvGrpSpPr>
@@ -2009,7 +2032,7 @@
       </p:grpSpPr>
       <p:sp>
         <p:nvSpPr>
-          <p:cNvPr id="144" name="Google Shape;144;p5:notes"/>
+          <p:cNvPr id="154" name="Google Shape;154;p5:notes"/>
           <p:cNvSpPr txBox="1"/>
           <p:nvPr>
             <p:ph idx="1" type="body"/>
@@ -2048,7 +2071,7 @@
       </p:sp>
       <p:sp>
         <p:nvSpPr>
-          <p:cNvPr id="145" name="Google Shape;145;p5:notes"/>
+          <p:cNvPr id="155" name="Google Shape;155;p5:notes"/>
           <p:cNvSpPr/>
           <p:nvPr>
             <p:ph idx="2" type="sldImg"/>
@@ -2094,7 +2117,7 @@
   <p:cSld>
     <p:spTree>
       <p:nvGrpSpPr>
-        <p:cNvPr id="159" name="Shape 159"/>
+        <p:cNvPr id="169" name="Shape 169"/>
         <p:cNvGrpSpPr/>
         <p:nvPr/>
       </p:nvGrpSpPr>
@@ -2108,7 +2131,7 @@
       </p:grpSpPr>
       <p:sp>
         <p:nvSpPr>
-          <p:cNvPr id="160" name="Google Shape;160;p6:notes"/>
+          <p:cNvPr id="170" name="Google Shape;170;p6:notes"/>
           <p:cNvSpPr txBox="1"/>
           <p:nvPr>
             <p:ph idx="1" type="body"/>
@@ -2147,7 +2170,7 @@
       </p:sp>
       <p:sp>
         <p:nvSpPr>
-          <p:cNvPr id="161" name="Google Shape;161;p6:notes"/>
+          <p:cNvPr id="171" name="Google Shape;171;p6:notes"/>
           <p:cNvSpPr/>
           <p:nvPr>
             <p:ph idx="2" type="sldImg"/>
@@ -2193,7 +2216,7 @@
   <p:cSld>
     <p:spTree>
       <p:nvGrpSpPr>
-        <p:cNvPr id="165" name="Shape 165"/>
+        <p:cNvPr id="175" name="Shape 175"/>
         <p:cNvGrpSpPr/>
         <p:nvPr/>
       </p:nvGrpSpPr>
@@ -2207,7 +2230,7 @@
       </p:grpSpPr>
       <p:sp>
         <p:nvSpPr>
-          <p:cNvPr id="166" name="Google Shape;166;p7:notes"/>
+          <p:cNvPr id="176" name="Google Shape;176;p7:notes"/>
           <p:cNvSpPr txBox="1"/>
           <p:nvPr>
             <p:ph idx="1" type="body"/>
@@ -2246,7 +2269,7 @@
       </p:sp>
       <p:sp>
         <p:nvSpPr>
-          <p:cNvPr id="167" name="Google Shape;167;p7:notes"/>
+          <p:cNvPr id="177" name="Google Shape;177;p7:notes"/>
           <p:cNvSpPr/>
           <p:nvPr>
             <p:ph idx="2" type="sldImg"/>
@@ -2292,7 +2315,7 @@
   <p:cSld>
     <p:spTree>
       <p:nvGrpSpPr>
-        <p:cNvPr id="189" name="Shape 189"/>
+        <p:cNvPr id="199" name="Shape 199"/>
         <p:cNvGrpSpPr/>
         <p:nvPr/>
       </p:nvGrpSpPr>
@@ -2306,7 +2329,7 @@
       </p:grpSpPr>
       <p:sp>
         <p:nvSpPr>
-          <p:cNvPr id="190" name="Google Shape;190;p8:notes"/>
+          <p:cNvPr id="200" name="Google Shape;200;p8:notes"/>
           <p:cNvSpPr/>
           <p:nvPr>
             <p:ph idx="2" type="sldImg"/>
@@ -2351,7 +2374,7 @@
       </p:sp>
       <p:sp>
         <p:nvSpPr>
-          <p:cNvPr id="191" name="Google Shape;191;p8:notes"/>
+          <p:cNvPr id="201" name="Google Shape;201;p8:notes"/>
           <p:cNvSpPr txBox="1"/>
           <p:nvPr>
             <p:ph idx="1" type="body"/>
@@ -2394,7 +2417,7 @@
       </p:sp>
       <p:sp>
         <p:nvSpPr>
-          <p:cNvPr id="192" name="Google Shape;192;p8:notes"/>
+          <p:cNvPr id="202" name="Google Shape;202;p8:notes"/>
           <p:cNvSpPr txBox="1"/>
           <p:nvPr>
             <p:ph idx="12" type="sldNum"/>
@@ -2449,7 +2472,7 @@
   <p:cSld>
     <p:spTree>
       <p:nvGrpSpPr>
-        <p:cNvPr id="234" name="Shape 234"/>
+        <p:cNvPr id="244" name="Shape 244"/>
         <p:cNvGrpSpPr/>
         <p:nvPr/>
       </p:nvGrpSpPr>
@@ -2463,7 +2486,7 @@
       </p:grpSpPr>
       <p:sp>
         <p:nvSpPr>
-          <p:cNvPr id="235" name="Google Shape;235;p9:notes"/>
+          <p:cNvPr id="245" name="Google Shape;245;p9:notes"/>
           <p:cNvSpPr txBox="1"/>
           <p:nvPr>
             <p:ph idx="1" type="body"/>
@@ -2502,7 +2525,7 @@
       </p:sp>
       <p:sp>
         <p:nvSpPr>
-          <p:cNvPr id="236" name="Google Shape;236;p9:notes"/>
+          <p:cNvPr id="246" name="Google Shape;246;p9:notes"/>
           <p:cNvSpPr/>
           <p:nvPr>
             <p:ph idx="2" type="sldImg"/>
@@ -5787,6 +5810,566 @@
           </a:lstStyle>
           <a:p>
             <a:pPr indent="0" lvl="0" marL="0" rtl="0" algn="l">
+              <a:spcBef>
+                <a:spcPts val="0"/>
+              </a:spcBef>
+              <a:spcAft>
+                <a:spcPts val="0"/>
+              </a:spcAft>
+              <a:buNone/>
+            </a:pPr>
+            <a:fld id="{00000000-1234-1234-1234-123412341234}" type="slidenum">
+              <a:rPr lang="en-US"/>
+              <a:t>‹#›</a:t>
+            </a:fld>
+            <a:endParaRPr/>
+          </a:p>
+        </p:txBody>
+      </p:sp>
+    </p:spTree>
+  </p:cSld>
+  <p:clrMapOvr>
+    <a:masterClrMapping/>
+  </p:clrMapOvr>
+</p:sldLayout>
+</file>
+
+<file path=ppt/slideLayouts/slideLayout12.xml><?xml version="1.0" encoding="utf-8"?>
+<p:sldLayout xmlns:a="http://schemas.openxmlformats.org/drawingml/2006/main" xmlns:r="http://schemas.openxmlformats.org/officeDocument/2006/relationships" xmlns:mc="http://schemas.openxmlformats.org/markup-compatibility/2006" xmlns:mv="urn:schemas-microsoft-com:mac:vml" xmlns:p="http://schemas.openxmlformats.org/presentationml/2006/main" xmlns:c="http://schemas.openxmlformats.org/drawingml/2006/chart" xmlns:dgm="http://schemas.openxmlformats.org/drawingml/2006/diagram" xmlns:o="urn:schemas-microsoft-com:office:office" xmlns:v="urn:schemas-microsoft-com:vml" xmlns:pvml="urn:schemas-microsoft-com:office:powerpoint" xmlns:com="http://schemas.openxmlformats.org/drawingml/2006/compatibility" xmlns:p14="http://schemas.microsoft.com/office/powerpoint/2010/main" xmlns:p15="http://schemas.microsoft.com/office/powerpoint/2012/main" xmlns:ahyp="http://schemas.microsoft.com/office/drawing/2018/hyperlinkcolor" matchingName="1_Title Slide">
+  <p:cSld name="1_Title Slide">
+    <p:bg>
+      <p:bgPr>
+        <a:solidFill>
+          <a:srgbClr val="4B2E83"/>
+        </a:solidFill>
+      </p:bgPr>
+    </p:bg>
+    <p:spTree>
+      <p:nvGrpSpPr>
+        <p:cNvPr id="88" name="Shape 88"/>
+        <p:cNvGrpSpPr/>
+        <p:nvPr/>
+      </p:nvGrpSpPr>
+      <p:grpSpPr>
+        <a:xfrm>
+          <a:off x="0" y="0"/>
+          <a:ext cx="0" cy="0"/>
+          <a:chOff x="0" y="0"/>
+          <a:chExt cx="0" cy="0"/>
+        </a:xfrm>
+      </p:grpSpPr>
+      <p:pic>
+        <p:nvPicPr>
+          <p:cNvPr descr="UW_W Logo_White.png" id="89" name="Google Shape;89;p13"/>
+          <p:cNvPicPr preferRelativeResize="0"/>
+          <p:nvPr/>
+        </p:nvPicPr>
+        <p:blipFill rotWithShape="1">
+          <a:blip r:embed="rId2">
+            <a:alphaModFix/>
+          </a:blip>
+          <a:srcRect b="0" l="0" r="0" t="0"/>
+          <a:stretch/>
+        </p:blipFill>
+        <p:spPr>
+          <a:xfrm>
+            <a:off x="7445815" y="5945854"/>
+            <a:ext cx="1371600" cy="923544"/>
+          </a:xfrm>
+          <a:prstGeom prst="rect">
+            <a:avLst/>
+          </a:prstGeom>
+          <a:noFill/>
+          <a:ln>
+            <a:noFill/>
+          </a:ln>
+        </p:spPr>
+      </p:pic>
+      <p:pic>
+        <p:nvPicPr>
+          <p:cNvPr id="90" name="Google Shape;90;p13"/>
+          <p:cNvPicPr preferRelativeResize="0"/>
+          <p:nvPr/>
+        </p:nvPicPr>
+        <p:blipFill rotWithShape="1">
+          <a:blip r:embed="rId3">
+            <a:alphaModFix/>
+          </a:blip>
+          <a:srcRect b="0" l="0" r="0" t="0"/>
+          <a:stretch/>
+        </p:blipFill>
+        <p:spPr>
+          <a:xfrm>
+            <a:off x="677334" y="6354234"/>
+            <a:ext cx="2540000" cy="200025"/>
+          </a:xfrm>
+          <a:prstGeom prst="rect">
+            <a:avLst/>
+          </a:prstGeom>
+          <a:noFill/>
+          <a:ln>
+            <a:noFill/>
+          </a:ln>
+        </p:spPr>
+      </p:pic>
+      <p:pic>
+        <p:nvPicPr>
+          <p:cNvPr descr="Bar_RtAngle_7502_RGB.png" id="91" name="Google Shape;91;p13"/>
+          <p:cNvPicPr preferRelativeResize="0"/>
+          <p:nvPr/>
+        </p:nvPicPr>
+        <p:blipFill rotWithShape="1">
+          <a:blip r:embed="rId4">
+            <a:alphaModFix/>
+          </a:blip>
+          <a:srcRect b="0" l="0" r="0" t="0"/>
+          <a:stretch/>
+        </p:blipFill>
+        <p:spPr>
+          <a:xfrm>
+            <a:off x="813588" y="4006085"/>
+            <a:ext cx="2284300" cy="112770"/>
+          </a:xfrm>
+          <a:prstGeom prst="rect">
+            <a:avLst/>
+          </a:prstGeom>
+          <a:noFill/>
+          <a:ln>
+            <a:noFill/>
+          </a:ln>
+        </p:spPr>
+      </p:pic>
+      <p:sp>
+        <p:nvSpPr>
+          <p:cNvPr id="92" name="Google Shape;92;p13"/>
+          <p:cNvSpPr txBox="1"/>
+          <p:nvPr>
+            <p:ph type="title"/>
+          </p:nvPr>
+        </p:nvSpPr>
+        <p:spPr>
+          <a:xfrm>
+            <a:off x="671757" y="1179824"/>
+            <a:ext cx="6972300" cy="2641800"/>
+          </a:xfrm>
+          <a:prstGeom prst="rect">
+            <a:avLst/>
+          </a:prstGeom>
+          <a:noFill/>
+          <a:ln>
+            <a:noFill/>
+          </a:ln>
+        </p:spPr>
+        <p:txBody>
+          <a:bodyPr anchorCtr="0" anchor="b" bIns="45700" lIns="91425" spcFirstLastPara="1" rIns="91425" wrap="square" tIns="45700">
+            <a:normAutofit/>
+          </a:bodyPr>
+          <a:lstStyle>
+            <a:lvl1pPr lvl="0" rtl="0" algn="l">
+              <a:lnSpc>
+                <a:spcPct val="90000"/>
+              </a:lnSpc>
+              <a:spcBef>
+                <a:spcPts val="0"/>
+              </a:spcBef>
+              <a:spcAft>
+                <a:spcPts val="0"/>
+              </a:spcAft>
+              <a:buClr>
+                <a:schemeClr val="lt2"/>
+              </a:buClr>
+              <a:buSzPts val="5000"/>
+              <a:buFont typeface="Encode Sans Condensed Thin"/>
+              <a:buNone/>
+              <a:defRPr b="1" i="0" sz="5000">
+                <a:solidFill>
+                  <a:schemeClr val="lt2"/>
+                </a:solidFill>
+                <a:latin typeface="Encode Sans Condensed Thin"/>
+                <a:ea typeface="Encode Sans Condensed Thin"/>
+                <a:cs typeface="Encode Sans Condensed Thin"/>
+                <a:sym typeface="Encode Sans Condensed Thin"/>
+              </a:defRPr>
+            </a:lvl1pPr>
+            <a:lvl2pPr lvl="1" rtl="0" algn="l">
+              <a:lnSpc>
+                <a:spcPct val="100000"/>
+              </a:lnSpc>
+              <a:spcBef>
+                <a:spcPts val="0"/>
+              </a:spcBef>
+              <a:spcAft>
+                <a:spcPts val="0"/>
+              </a:spcAft>
+              <a:buSzPts val="1400"/>
+              <a:buNone/>
+              <a:defRPr/>
+            </a:lvl2pPr>
+            <a:lvl3pPr lvl="2" rtl="0" algn="l">
+              <a:lnSpc>
+                <a:spcPct val="100000"/>
+              </a:lnSpc>
+              <a:spcBef>
+                <a:spcPts val="0"/>
+              </a:spcBef>
+              <a:spcAft>
+                <a:spcPts val="0"/>
+              </a:spcAft>
+              <a:buSzPts val="1400"/>
+              <a:buNone/>
+              <a:defRPr/>
+            </a:lvl3pPr>
+            <a:lvl4pPr lvl="3" rtl="0" algn="l">
+              <a:lnSpc>
+                <a:spcPct val="100000"/>
+              </a:lnSpc>
+              <a:spcBef>
+                <a:spcPts val="0"/>
+              </a:spcBef>
+              <a:spcAft>
+                <a:spcPts val="0"/>
+              </a:spcAft>
+              <a:buSzPts val="1400"/>
+              <a:buNone/>
+              <a:defRPr/>
+            </a:lvl4pPr>
+            <a:lvl5pPr lvl="4" rtl="0" algn="l">
+              <a:lnSpc>
+                <a:spcPct val="100000"/>
+              </a:lnSpc>
+              <a:spcBef>
+                <a:spcPts val="0"/>
+              </a:spcBef>
+              <a:spcAft>
+                <a:spcPts val="0"/>
+              </a:spcAft>
+              <a:buSzPts val="1400"/>
+              <a:buNone/>
+              <a:defRPr/>
+            </a:lvl5pPr>
+            <a:lvl6pPr lvl="5" rtl="0" algn="l">
+              <a:lnSpc>
+                <a:spcPct val="100000"/>
+              </a:lnSpc>
+              <a:spcBef>
+                <a:spcPts val="0"/>
+              </a:spcBef>
+              <a:spcAft>
+                <a:spcPts val="0"/>
+              </a:spcAft>
+              <a:buSzPts val="1400"/>
+              <a:buNone/>
+              <a:defRPr/>
+            </a:lvl6pPr>
+            <a:lvl7pPr lvl="6" rtl="0" algn="l">
+              <a:lnSpc>
+                <a:spcPct val="100000"/>
+              </a:lnSpc>
+              <a:spcBef>
+                <a:spcPts val="0"/>
+              </a:spcBef>
+              <a:spcAft>
+                <a:spcPts val="0"/>
+              </a:spcAft>
+              <a:buSzPts val="1400"/>
+              <a:buNone/>
+              <a:defRPr/>
+            </a:lvl7pPr>
+            <a:lvl8pPr lvl="7" rtl="0" algn="l">
+              <a:lnSpc>
+                <a:spcPct val="100000"/>
+              </a:lnSpc>
+              <a:spcBef>
+                <a:spcPts val="0"/>
+              </a:spcBef>
+              <a:spcAft>
+                <a:spcPts val="0"/>
+              </a:spcAft>
+              <a:buSzPts val="1400"/>
+              <a:buNone/>
+              <a:defRPr/>
+            </a:lvl8pPr>
+            <a:lvl9pPr lvl="8" rtl="0" algn="l">
+              <a:lnSpc>
+                <a:spcPct val="100000"/>
+              </a:lnSpc>
+              <a:spcBef>
+                <a:spcPts val="0"/>
+              </a:spcBef>
+              <a:spcAft>
+                <a:spcPts val="0"/>
+              </a:spcAft>
+              <a:buSzPts val="1400"/>
+              <a:buNone/>
+              <a:defRPr/>
+            </a:lvl9pPr>
+          </a:lstStyle>
+          <a:p/>
+        </p:txBody>
+      </p:sp>
+      <p:sp>
+        <p:nvSpPr>
+          <p:cNvPr id="93" name="Google Shape;93;p13"/>
+          <p:cNvSpPr txBox="1"/>
+          <p:nvPr>
+            <p:ph idx="12" type="sldNum"/>
+          </p:nvPr>
+        </p:nvSpPr>
+        <p:spPr>
+          <a:xfrm>
+            <a:off x="8556784" y="6333134"/>
+            <a:ext cx="548700" cy="525000"/>
+          </a:xfrm>
+          <a:prstGeom prst="rect">
+            <a:avLst/>
+          </a:prstGeom>
+          <a:noFill/>
+          <a:ln>
+            <a:noFill/>
+          </a:ln>
+        </p:spPr>
+        <p:txBody>
+          <a:bodyPr anchorCtr="0" anchor="t" bIns="45700" lIns="91425" spcFirstLastPara="1" rIns="91425" wrap="square" tIns="45700">
+            <a:noAutofit/>
+          </a:bodyPr>
+          <a:lstStyle>
+            <a:lvl1pPr indent="0" lvl="0" marL="0" marR="0" rtl="0" algn="r">
+              <a:lnSpc>
+                <a:spcPct val="100000"/>
+              </a:lnSpc>
+              <a:spcBef>
+                <a:spcPts val="0"/>
+              </a:spcBef>
+              <a:spcAft>
+                <a:spcPts val="0"/>
+              </a:spcAft>
+              <a:buClr>
+                <a:srgbClr val="000000"/>
+              </a:buClr>
+              <a:buSzPts val="1300"/>
+              <a:buFont typeface="Arial"/>
+              <a:buNone/>
+              <a:defRPr b="0" i="0" sz="1300" u="none" cap="none" strike="noStrike">
+                <a:solidFill>
+                  <a:schemeClr val="lt1"/>
+                </a:solidFill>
+                <a:latin typeface="Calibri"/>
+                <a:ea typeface="Calibri"/>
+                <a:cs typeface="Calibri"/>
+                <a:sym typeface="Calibri"/>
+              </a:defRPr>
+            </a:lvl1pPr>
+            <a:lvl2pPr indent="0" lvl="1" marL="0" marR="0" rtl="0" algn="r">
+              <a:lnSpc>
+                <a:spcPct val="100000"/>
+              </a:lnSpc>
+              <a:spcBef>
+                <a:spcPts val="0"/>
+              </a:spcBef>
+              <a:spcAft>
+                <a:spcPts val="0"/>
+              </a:spcAft>
+              <a:buClr>
+                <a:srgbClr val="000000"/>
+              </a:buClr>
+              <a:buSzPts val="1300"/>
+              <a:buFont typeface="Arial"/>
+              <a:buNone/>
+              <a:defRPr b="0" i="0" sz="1300" u="none" cap="none" strike="noStrike">
+                <a:solidFill>
+                  <a:schemeClr val="lt1"/>
+                </a:solidFill>
+                <a:latin typeface="Calibri"/>
+                <a:ea typeface="Calibri"/>
+                <a:cs typeface="Calibri"/>
+                <a:sym typeface="Calibri"/>
+              </a:defRPr>
+            </a:lvl2pPr>
+            <a:lvl3pPr indent="0" lvl="2" marL="0" marR="0" rtl="0" algn="r">
+              <a:lnSpc>
+                <a:spcPct val="100000"/>
+              </a:lnSpc>
+              <a:spcBef>
+                <a:spcPts val="0"/>
+              </a:spcBef>
+              <a:spcAft>
+                <a:spcPts val="0"/>
+              </a:spcAft>
+              <a:buClr>
+                <a:srgbClr val="000000"/>
+              </a:buClr>
+              <a:buSzPts val="1300"/>
+              <a:buFont typeface="Arial"/>
+              <a:buNone/>
+              <a:defRPr b="0" i="0" sz="1300" u="none" cap="none" strike="noStrike">
+                <a:solidFill>
+                  <a:schemeClr val="lt1"/>
+                </a:solidFill>
+                <a:latin typeface="Calibri"/>
+                <a:ea typeface="Calibri"/>
+                <a:cs typeface="Calibri"/>
+                <a:sym typeface="Calibri"/>
+              </a:defRPr>
+            </a:lvl3pPr>
+            <a:lvl4pPr indent="0" lvl="3" marL="0" marR="0" rtl="0" algn="r">
+              <a:lnSpc>
+                <a:spcPct val="100000"/>
+              </a:lnSpc>
+              <a:spcBef>
+                <a:spcPts val="0"/>
+              </a:spcBef>
+              <a:spcAft>
+                <a:spcPts val="0"/>
+              </a:spcAft>
+              <a:buClr>
+                <a:srgbClr val="000000"/>
+              </a:buClr>
+              <a:buSzPts val="1300"/>
+              <a:buFont typeface="Arial"/>
+              <a:buNone/>
+              <a:defRPr b="0" i="0" sz="1300" u="none" cap="none" strike="noStrike">
+                <a:solidFill>
+                  <a:schemeClr val="lt1"/>
+                </a:solidFill>
+                <a:latin typeface="Calibri"/>
+                <a:ea typeface="Calibri"/>
+                <a:cs typeface="Calibri"/>
+                <a:sym typeface="Calibri"/>
+              </a:defRPr>
+            </a:lvl4pPr>
+            <a:lvl5pPr indent="0" lvl="4" marL="0" marR="0" rtl="0" algn="r">
+              <a:lnSpc>
+                <a:spcPct val="100000"/>
+              </a:lnSpc>
+              <a:spcBef>
+                <a:spcPts val="0"/>
+              </a:spcBef>
+              <a:spcAft>
+                <a:spcPts val="0"/>
+              </a:spcAft>
+              <a:buClr>
+                <a:srgbClr val="000000"/>
+              </a:buClr>
+              <a:buSzPts val="1300"/>
+              <a:buFont typeface="Arial"/>
+              <a:buNone/>
+              <a:defRPr b="0" i="0" sz="1300" u="none" cap="none" strike="noStrike">
+                <a:solidFill>
+                  <a:schemeClr val="lt1"/>
+                </a:solidFill>
+                <a:latin typeface="Calibri"/>
+                <a:ea typeface="Calibri"/>
+                <a:cs typeface="Calibri"/>
+                <a:sym typeface="Calibri"/>
+              </a:defRPr>
+            </a:lvl5pPr>
+            <a:lvl6pPr indent="0" lvl="5" marL="0" marR="0" rtl="0" algn="r">
+              <a:lnSpc>
+                <a:spcPct val="100000"/>
+              </a:lnSpc>
+              <a:spcBef>
+                <a:spcPts val="0"/>
+              </a:spcBef>
+              <a:spcAft>
+                <a:spcPts val="0"/>
+              </a:spcAft>
+              <a:buClr>
+                <a:srgbClr val="000000"/>
+              </a:buClr>
+              <a:buSzPts val="1300"/>
+              <a:buFont typeface="Arial"/>
+              <a:buNone/>
+              <a:defRPr b="0" i="0" sz="1300" u="none" cap="none" strike="noStrike">
+                <a:solidFill>
+                  <a:schemeClr val="lt1"/>
+                </a:solidFill>
+                <a:latin typeface="Calibri"/>
+                <a:ea typeface="Calibri"/>
+                <a:cs typeface="Calibri"/>
+                <a:sym typeface="Calibri"/>
+              </a:defRPr>
+            </a:lvl6pPr>
+            <a:lvl7pPr indent="0" lvl="6" marL="0" marR="0" rtl="0" algn="r">
+              <a:lnSpc>
+                <a:spcPct val="100000"/>
+              </a:lnSpc>
+              <a:spcBef>
+                <a:spcPts val="0"/>
+              </a:spcBef>
+              <a:spcAft>
+                <a:spcPts val="0"/>
+              </a:spcAft>
+              <a:buClr>
+                <a:srgbClr val="000000"/>
+              </a:buClr>
+              <a:buSzPts val="1300"/>
+              <a:buFont typeface="Arial"/>
+              <a:buNone/>
+              <a:defRPr b="0" i="0" sz="1300" u="none" cap="none" strike="noStrike">
+                <a:solidFill>
+                  <a:schemeClr val="lt1"/>
+                </a:solidFill>
+                <a:latin typeface="Calibri"/>
+                <a:ea typeface="Calibri"/>
+                <a:cs typeface="Calibri"/>
+                <a:sym typeface="Calibri"/>
+              </a:defRPr>
+            </a:lvl7pPr>
+            <a:lvl8pPr indent="0" lvl="7" marL="0" marR="0" rtl="0" algn="r">
+              <a:lnSpc>
+                <a:spcPct val="100000"/>
+              </a:lnSpc>
+              <a:spcBef>
+                <a:spcPts val="0"/>
+              </a:spcBef>
+              <a:spcAft>
+                <a:spcPts val="0"/>
+              </a:spcAft>
+              <a:buClr>
+                <a:srgbClr val="000000"/>
+              </a:buClr>
+              <a:buSzPts val="1300"/>
+              <a:buFont typeface="Arial"/>
+              <a:buNone/>
+              <a:defRPr b="0" i="0" sz="1300" u="none" cap="none" strike="noStrike">
+                <a:solidFill>
+                  <a:schemeClr val="lt1"/>
+                </a:solidFill>
+                <a:latin typeface="Calibri"/>
+                <a:ea typeface="Calibri"/>
+                <a:cs typeface="Calibri"/>
+                <a:sym typeface="Calibri"/>
+              </a:defRPr>
+            </a:lvl8pPr>
+            <a:lvl9pPr indent="0" lvl="8" marL="0" marR="0" rtl="0" algn="r">
+              <a:lnSpc>
+                <a:spcPct val="100000"/>
+              </a:lnSpc>
+              <a:spcBef>
+                <a:spcPts val="0"/>
+              </a:spcBef>
+              <a:spcAft>
+                <a:spcPts val="0"/>
+              </a:spcAft>
+              <a:buClr>
+                <a:srgbClr val="000000"/>
+              </a:buClr>
+              <a:buSzPts val="1300"/>
+              <a:buFont typeface="Arial"/>
+              <a:buNone/>
+              <a:defRPr b="0" i="0" sz="1300" u="none" cap="none" strike="noStrike">
+                <a:solidFill>
+                  <a:schemeClr val="lt1"/>
+                </a:solidFill>
+                <a:latin typeface="Calibri"/>
+                <a:ea typeface="Calibri"/>
+                <a:cs typeface="Calibri"/>
+                <a:sym typeface="Calibri"/>
+              </a:defRPr>
+            </a:lvl9pPr>
+          </a:lstStyle>
+          <a:p>
+            <a:pPr indent="0" lvl="0" marL="0" rtl="0" algn="r">
               <a:spcBef>
                 <a:spcPts val="0"/>
               </a:spcBef>
@@ -13552,6 +14135,7 @@
     <p:sldLayoutId id="2147483656" r:id="rId12"/>
     <p:sldLayoutId id="2147483657" r:id="rId13"/>
     <p:sldLayoutId id="2147483658" r:id="rId14"/>
+    <p:sldLayoutId id="2147483659" r:id="rId15"/>
   </p:sldLayoutIdLst>
   <p:hf dt="0" ftr="0" hdr="0"/>
   <p:txStyles>
@@ -14251,7 +14835,7 @@
   <p:cSld>
     <p:spTree>
       <p:nvGrpSpPr>
-        <p:cNvPr id="92" name="Shape 92"/>
+        <p:cNvPr id="98" name="Shape 98"/>
         <p:cNvGrpSpPr/>
         <p:nvPr/>
       </p:nvGrpSpPr>
@@ -14263,18 +14847,456 @@
           <a:chExt cx="0" cy="0"/>
         </a:xfrm>
       </p:grpSpPr>
+      <p:pic>
+        <p:nvPicPr>
+          <p:cNvPr descr="A picture containing drawing&#10;&#10;Description automatically generated" id="99" name="Google Shape;99;p14"/>
+          <p:cNvPicPr preferRelativeResize="0"/>
+          <p:nvPr/>
+        </p:nvPicPr>
+        <p:blipFill rotWithShape="1">
+          <a:blip r:embed="rId3">
+            <a:alphaModFix amt="85000"/>
+          </a:blip>
+          <a:srcRect b="35275" l="0" r="0" t="0"/>
+          <a:stretch/>
+        </p:blipFill>
+        <p:spPr>
+          <a:xfrm>
+            <a:off x="4985426" y="5928416"/>
+            <a:ext cx="535022" cy="354361"/>
+          </a:xfrm>
+          <a:prstGeom prst="rect">
+            <a:avLst/>
+          </a:prstGeom>
+          <a:noFill/>
+          <a:ln>
+            <a:noFill/>
+          </a:ln>
+        </p:spPr>
+      </p:pic>
       <p:sp>
         <p:nvSpPr>
-          <p:cNvPr id="93" name="Google Shape;93;p13"/>
+          <p:cNvPr id="100" name="Google Shape;100;p14"/>
           <p:cNvSpPr txBox="1"/>
           <p:nvPr>
-            <p:ph type="ctrTitle"/>
+            <p:ph type="title"/>
           </p:nvPr>
         </p:nvSpPr>
         <p:spPr>
           <a:xfrm>
-            <a:off x="685800" y="533400"/>
-            <a:ext cx="8077200" cy="1470025"/>
+            <a:off x="671756" y="214057"/>
+            <a:ext cx="8120400" cy="2641800"/>
+          </a:xfrm>
+          <a:prstGeom prst="rect">
+            <a:avLst/>
+          </a:prstGeom>
+          <a:noFill/>
+          <a:ln>
+            <a:noFill/>
+          </a:ln>
+        </p:spPr>
+        <p:txBody>
+          <a:bodyPr anchorCtr="0" anchor="b" bIns="45700" lIns="91425" spcFirstLastPara="1" rIns="91425" wrap="square" tIns="45700">
+            <a:normAutofit/>
+          </a:bodyPr>
+          <a:lstStyle/>
+          <a:p>
+            <a:pPr indent="0" lvl="0" marL="0" rtl="0" algn="l">
+              <a:lnSpc>
+                <a:spcPct val="90000"/>
+              </a:lnSpc>
+              <a:spcBef>
+                <a:spcPts val="0"/>
+              </a:spcBef>
+              <a:spcAft>
+                <a:spcPts val="0"/>
+              </a:spcAft>
+              <a:buClr>
+                <a:schemeClr val="lt2"/>
+              </a:buClr>
+              <a:buSzPts val="5000"/>
+              <a:buFont typeface="Encode Sans Condensed Thin"/>
+              <a:buNone/>
+            </a:pPr>
+            <a:r>
+              <a:rPr lang="en-US"/>
+              <a:t>Modeling With Uncertainty</a:t>
+            </a:r>
+            <a:r>
+              <a:rPr lang="en-US"/>
+              <a:t>:</a:t>
+            </a:r>
+            <a:endParaRPr/>
+          </a:p>
+          <a:p>
+            <a:pPr indent="0" lvl="0" marL="0" rtl="0" algn="l">
+              <a:lnSpc>
+                <a:spcPct val="90000"/>
+              </a:lnSpc>
+              <a:spcBef>
+                <a:spcPts val="0"/>
+              </a:spcBef>
+              <a:spcAft>
+                <a:spcPts val="0"/>
+              </a:spcAft>
+              <a:buClr>
+                <a:schemeClr val="lt2"/>
+              </a:buClr>
+              <a:buSzPts val="5000"/>
+              <a:buFont typeface="Encode Sans Condensed Thin"/>
+              <a:buNone/>
+            </a:pPr>
+            <a:r>
+              <a:rPr i="1" lang="en-US"/>
+              <a:t>Overview</a:t>
+            </a:r>
+            <a:endParaRPr i="1"/>
+          </a:p>
+        </p:txBody>
+      </p:sp>
+      <p:sp>
+        <p:nvSpPr>
+          <p:cNvPr id="101" name="Google Shape;101;p14"/>
+          <p:cNvSpPr txBox="1"/>
+          <p:nvPr/>
+        </p:nvSpPr>
+        <p:spPr>
+          <a:xfrm>
+            <a:off x="1700320" y="4200848"/>
+            <a:ext cx="6201300" cy="1416000"/>
+          </a:xfrm>
+          <a:prstGeom prst="rect">
+            <a:avLst/>
+          </a:prstGeom>
+          <a:noFill/>
+          <a:ln>
+            <a:noFill/>
+          </a:ln>
+        </p:spPr>
+        <p:txBody>
+          <a:bodyPr anchorCtr="0" anchor="t" bIns="45700" lIns="91425" spcFirstLastPara="1" rIns="91425" wrap="square" tIns="45700">
+            <a:spAutoFit/>
+          </a:bodyPr>
+          <a:lstStyle/>
+          <a:p>
+            <a:pPr indent="0" lvl="0" marL="0" marR="0" rtl="0" algn="l">
+              <a:lnSpc>
+                <a:spcPct val="100000"/>
+              </a:lnSpc>
+              <a:spcBef>
+                <a:spcPts val="0"/>
+              </a:spcBef>
+              <a:spcAft>
+                <a:spcPts val="0"/>
+              </a:spcAft>
+              <a:buClr>
+                <a:srgbClr val="000000"/>
+              </a:buClr>
+              <a:buSzPts val="1800"/>
+              <a:buFont typeface="Arial"/>
+              <a:buNone/>
+            </a:pPr>
+            <a:r>
+              <a:rPr b="0" i="0" lang="en-US" sz="1800" u="none" cap="none" strike="noStrike">
+                <a:solidFill>
+                  <a:schemeClr val="lt1"/>
+                </a:solidFill>
+                <a:latin typeface="Calibri"/>
+                <a:ea typeface="Calibri"/>
+                <a:cs typeface="Calibri"/>
+                <a:sym typeface="Calibri"/>
+              </a:rPr>
+              <a:t>Joseph L. Hellerstein</a:t>
+            </a:r>
+            <a:r>
+              <a:rPr b="0" baseline="30000" i="0" lang="en-US" sz="1800" u="none" cap="none" strike="noStrike">
+                <a:solidFill>
+                  <a:schemeClr val="lt1"/>
+                </a:solidFill>
+                <a:latin typeface="Calibri"/>
+                <a:ea typeface="Calibri"/>
+                <a:cs typeface="Calibri"/>
+                <a:sym typeface="Calibri"/>
+              </a:rPr>
+              <a:t>1,2</a:t>
+            </a:r>
+            <a:r>
+              <a:rPr b="0" i="0" lang="en-US" sz="1800" u="none" cap="none" strike="noStrike">
+                <a:solidFill>
+                  <a:schemeClr val="lt1"/>
+                </a:solidFill>
+                <a:latin typeface="Calibri"/>
+                <a:ea typeface="Calibri"/>
+                <a:cs typeface="Calibri"/>
+                <a:sym typeface="Calibri"/>
+              </a:rPr>
+              <a:t> </a:t>
+            </a:r>
+            <a:endParaRPr b="0" i="0" sz="1800" u="none" cap="none" strike="noStrike">
+              <a:solidFill>
+                <a:schemeClr val="lt1"/>
+              </a:solidFill>
+              <a:latin typeface="Calibri"/>
+              <a:ea typeface="Calibri"/>
+              <a:cs typeface="Calibri"/>
+              <a:sym typeface="Calibri"/>
+            </a:endParaRPr>
+          </a:p>
+          <a:p>
+            <a:pPr indent="0" lvl="0" marL="0" marR="0" rtl="0" algn="l">
+              <a:lnSpc>
+                <a:spcPct val="100000"/>
+              </a:lnSpc>
+              <a:spcBef>
+                <a:spcPts val="0"/>
+              </a:spcBef>
+              <a:spcAft>
+                <a:spcPts val="0"/>
+              </a:spcAft>
+              <a:buClr>
+                <a:srgbClr val="000000"/>
+              </a:buClr>
+              <a:buSzPts val="1800"/>
+              <a:buFont typeface="Arial"/>
+              <a:buNone/>
+            </a:pPr>
+            <a:r>
+              <a:rPr b="0" baseline="30000" i="0" lang="en-US" sz="1800" u="none" cap="none" strike="noStrike">
+                <a:solidFill>
+                  <a:schemeClr val="lt1"/>
+                </a:solidFill>
+                <a:latin typeface="Calibri"/>
+                <a:ea typeface="Calibri"/>
+                <a:cs typeface="Calibri"/>
+                <a:sym typeface="Calibri"/>
+              </a:rPr>
+              <a:t>1</a:t>
+            </a:r>
+            <a:r>
+              <a:rPr b="0" i="0" lang="en-US" sz="1800" u="none" cap="none" strike="noStrike">
+                <a:solidFill>
+                  <a:schemeClr val="lt1"/>
+                </a:solidFill>
+                <a:latin typeface="Calibri"/>
+                <a:ea typeface="Calibri"/>
+                <a:cs typeface="Calibri"/>
+                <a:sym typeface="Calibri"/>
+              </a:rPr>
+              <a:t>eScience Institute</a:t>
+            </a:r>
+            <a:endParaRPr b="0" baseline="30000" i="0" sz="1800" u="none" cap="none" strike="noStrike">
+              <a:solidFill>
+                <a:schemeClr val="lt1"/>
+              </a:solidFill>
+              <a:latin typeface="Calibri"/>
+              <a:ea typeface="Calibri"/>
+              <a:cs typeface="Calibri"/>
+              <a:sym typeface="Calibri"/>
+            </a:endParaRPr>
+          </a:p>
+          <a:p>
+            <a:pPr indent="0" lvl="0" marL="0" marR="0" rtl="0" algn="l">
+              <a:lnSpc>
+                <a:spcPct val="100000"/>
+              </a:lnSpc>
+              <a:spcBef>
+                <a:spcPts val="0"/>
+              </a:spcBef>
+              <a:spcAft>
+                <a:spcPts val="0"/>
+              </a:spcAft>
+              <a:buClr>
+                <a:srgbClr val="000000"/>
+              </a:buClr>
+              <a:buSzPts val="1800"/>
+              <a:buFont typeface="Arial"/>
+              <a:buNone/>
+            </a:pPr>
+            <a:r>
+              <a:rPr b="0" baseline="30000" i="0" lang="en-US" sz="1800" u="none" cap="none" strike="noStrike">
+                <a:solidFill>
+                  <a:schemeClr val="lt1"/>
+                </a:solidFill>
+                <a:latin typeface="Calibri"/>
+                <a:ea typeface="Calibri"/>
+                <a:cs typeface="Calibri"/>
+                <a:sym typeface="Calibri"/>
+              </a:rPr>
+              <a:t>2</a:t>
+            </a:r>
+            <a:r>
+              <a:rPr b="0" i="0" lang="en-US" sz="1800" u="none" cap="none" strike="noStrike">
+                <a:solidFill>
+                  <a:schemeClr val="lt1"/>
+                </a:solidFill>
+                <a:latin typeface="Calibri"/>
+                <a:ea typeface="Calibri"/>
+                <a:cs typeface="Calibri"/>
+                <a:sym typeface="Calibri"/>
+              </a:rPr>
+              <a:t>Department of Computer Science &amp; Engineering</a:t>
+            </a:r>
+            <a:endParaRPr b="0" i="0" sz="1400" u="none" cap="none" strike="noStrike">
+              <a:solidFill>
+                <a:srgbClr val="000000"/>
+              </a:solidFill>
+              <a:latin typeface="Arial"/>
+              <a:ea typeface="Arial"/>
+              <a:cs typeface="Arial"/>
+              <a:sym typeface="Arial"/>
+            </a:endParaRPr>
+          </a:p>
+          <a:p>
+            <a:pPr indent="0" lvl="0" marL="0" marR="0" rtl="0" algn="l">
+              <a:lnSpc>
+                <a:spcPct val="100000"/>
+              </a:lnSpc>
+              <a:spcBef>
+                <a:spcPts val="0"/>
+              </a:spcBef>
+              <a:spcAft>
+                <a:spcPts val="0"/>
+              </a:spcAft>
+              <a:buClr>
+                <a:srgbClr val="000000"/>
+              </a:buClr>
+              <a:buSzPts val="1800"/>
+              <a:buFont typeface="Arial"/>
+              <a:buNone/>
+            </a:pPr>
+            <a:r>
+              <a:t/>
+            </a:r>
+            <a:endParaRPr b="0" i="0" sz="1400" u="none" cap="none" strike="noStrike">
+              <a:solidFill>
+                <a:srgbClr val="000000"/>
+              </a:solidFill>
+              <a:latin typeface="Arial"/>
+              <a:ea typeface="Arial"/>
+              <a:cs typeface="Arial"/>
+              <a:sym typeface="Arial"/>
+            </a:endParaRPr>
+          </a:p>
+          <a:p>
+            <a:pPr indent="0" lvl="0" marL="0" marR="0" rtl="0" algn="l">
+              <a:lnSpc>
+                <a:spcPct val="100000"/>
+              </a:lnSpc>
+              <a:spcBef>
+                <a:spcPts val="0"/>
+              </a:spcBef>
+              <a:spcAft>
+                <a:spcPts val="0"/>
+              </a:spcAft>
+              <a:buClr>
+                <a:srgbClr val="000000"/>
+              </a:buClr>
+              <a:buSzPts val="1800"/>
+              <a:buFont typeface="Arial"/>
+              <a:buNone/>
+            </a:pPr>
+            <a:r>
+              <a:rPr lang="en-US" sz="1800">
+                <a:solidFill>
+                  <a:schemeClr val="lt1"/>
+                </a:solidFill>
+                <a:latin typeface="Calibri"/>
+                <a:ea typeface="Calibri"/>
+                <a:cs typeface="Calibri"/>
+                <a:sym typeface="Calibri"/>
+              </a:rPr>
+              <a:t>July</a:t>
+            </a:r>
+            <a:r>
+              <a:rPr b="0" i="0" lang="en-US" sz="1800" u="none" cap="none" strike="noStrike">
+                <a:solidFill>
+                  <a:schemeClr val="lt1"/>
+                </a:solidFill>
+                <a:latin typeface="Calibri"/>
+                <a:ea typeface="Calibri"/>
+                <a:cs typeface="Calibri"/>
+                <a:sym typeface="Calibri"/>
+              </a:rPr>
+              <a:t>, 2021</a:t>
+            </a:r>
+            <a:endParaRPr b="0" i="0" sz="1400" u="none" cap="none" strike="noStrike">
+              <a:solidFill>
+                <a:srgbClr val="000000"/>
+              </a:solidFill>
+              <a:latin typeface="Arial"/>
+              <a:ea typeface="Arial"/>
+              <a:cs typeface="Arial"/>
+              <a:sym typeface="Arial"/>
+            </a:endParaRPr>
+          </a:p>
+        </p:txBody>
+      </p:sp>
+      <p:pic>
+        <p:nvPicPr>
+          <p:cNvPr id="102" name="Google Shape;102;p14"/>
+          <p:cNvPicPr preferRelativeResize="0"/>
+          <p:nvPr/>
+        </p:nvPicPr>
+        <p:blipFill rotWithShape="1">
+          <a:blip r:embed="rId4">
+            <a:alphaModFix/>
+          </a:blip>
+          <a:srcRect b="0" l="0" r="0" t="0"/>
+          <a:stretch/>
+        </p:blipFill>
+        <p:spPr>
+          <a:xfrm>
+            <a:off x="1700320" y="5939821"/>
+            <a:ext cx="1556325" cy="257217"/>
+          </a:xfrm>
+          <a:prstGeom prst="rect">
+            <a:avLst/>
+          </a:prstGeom>
+          <a:noFill/>
+          <a:ln>
+            <a:noFill/>
+          </a:ln>
+        </p:spPr>
+      </p:pic>
+      <p:pic>
+        <p:nvPicPr>
+          <p:cNvPr descr="A close up of a screen&#10;&#10;Description automatically generated" id="103" name="Google Shape;103;p14"/>
+          <p:cNvPicPr preferRelativeResize="0"/>
+          <p:nvPr/>
+        </p:nvPicPr>
+        <p:blipFill rotWithShape="1">
+          <a:blip r:embed="rId5">
+            <a:alphaModFix/>
+          </a:blip>
+          <a:srcRect b="0" l="0" r="0" t="0"/>
+          <a:stretch/>
+        </p:blipFill>
+        <p:spPr>
+          <a:xfrm>
+            <a:off x="3171587" y="5930993"/>
+            <a:ext cx="1629341" cy="263838"/>
+          </a:xfrm>
+          <a:prstGeom prst="rect">
+            <a:avLst/>
+          </a:prstGeom>
+          <a:noFill/>
+          <a:ln>
+            <a:noFill/>
+          </a:ln>
+        </p:spPr>
+      </p:pic>
+      <p:sp>
+        <p:nvSpPr>
+          <p:cNvPr id="104" name="Google Shape;104;p14"/>
+          <p:cNvSpPr txBox="1"/>
+          <p:nvPr>
+            <p:ph idx="12" type="sldNum"/>
+          </p:nvPr>
+        </p:nvSpPr>
+        <p:spPr>
+          <a:xfrm>
+            <a:off x="8556784" y="6333134"/>
+            <a:ext cx="548700" cy="525000"/>
           </a:xfrm>
           <a:prstGeom prst="rect">
             <a:avLst/>
@@ -14290,173 +15312,24 @@
           </a:bodyPr>
           <a:lstStyle/>
           <a:p>
-            <a:pPr indent="0" lvl="0" marL="0" rtl="0" algn="ctr">
-              <a:spcBef>
-                <a:spcPts val="0"/>
-              </a:spcBef>
-              <a:spcAft>
-                <a:spcPts val="0"/>
-              </a:spcAft>
+            <a:pPr indent="0" lvl="0" marL="0" rtl="0" algn="r">
+              <a:lnSpc>
+                <a:spcPct val="100000"/>
+              </a:lnSpc>
+              <a:spcBef>
+                <a:spcPts val="0"/>
+              </a:spcBef>
+              <a:spcAft>
+                <a:spcPts val="0"/>
+              </a:spcAft>
+              <a:buSzPts val="1300"/>
               <a:buNone/>
             </a:pPr>
-            <a:r>
-              <a:rPr b="1" lang="en-US" sz="3200"/>
-              <a:t>Computational Systems Biology for </a:t>
-            </a:r>
-            <a:br>
-              <a:rPr b="1" lang="en-US" sz="3200"/>
-            </a:br>
-            <a:r>
-              <a:rPr b="1" lang="en-US" sz="3200"/>
-              <a:t>Medical Applications</a:t>
-            </a:r>
-            <a:br>
-              <a:rPr b="1" lang="en-US" sz="3200"/>
-            </a:br>
-            <a:br>
-              <a:rPr b="1" lang="en-US" sz="3200"/>
-            </a:br>
-            <a:br>
-              <a:rPr b="1" lang="en-US" sz="3200"/>
-            </a:br>
-            <a:r>
-              <a:rPr b="1" lang="en-US" sz="2800" u="sng"/>
-              <a:t>Model Fitting-Dealing With Uncertainty</a:t>
-            </a:r>
-            <a:br>
-              <a:rPr b="1" lang="en-US"/>
-            </a:br>
-            <a:br>
-              <a:rPr b="1" lang="en-US"/>
-            </a:br>
-            <a:endParaRPr i="1"/>
-          </a:p>
-        </p:txBody>
-      </p:sp>
-      <p:sp>
-        <p:nvSpPr>
-          <p:cNvPr id="94" name="Google Shape;94;p13"/>
-          <p:cNvSpPr txBox="1"/>
-          <p:nvPr>
-            <p:ph idx="1" type="subTitle"/>
-          </p:nvPr>
-        </p:nvSpPr>
-        <p:spPr>
-          <a:xfrm>
-            <a:off x="381000" y="3886200"/>
-            <a:ext cx="8382000" cy="1752600"/>
-          </a:xfrm>
-          <a:prstGeom prst="rect">
-            <a:avLst/>
-          </a:prstGeom>
-          <a:noFill/>
-          <a:ln>
-            <a:noFill/>
-          </a:ln>
-        </p:spPr>
-        <p:txBody>
-          <a:bodyPr anchorCtr="0" anchor="t" bIns="45700" lIns="91425" spcFirstLastPara="1" rIns="91425" wrap="square" tIns="45700">
-            <a:noAutofit/>
-          </a:bodyPr>
-          <a:lstStyle/>
-          <a:p>
-            <a:pPr indent="0" lvl="0" marL="0" rtl="0" algn="ctr">
-              <a:spcBef>
-                <a:spcPts val="0"/>
-              </a:spcBef>
-              <a:spcAft>
-                <a:spcPts val="0"/>
-              </a:spcAft>
-              <a:buClr>
-                <a:srgbClr val="FFFFFF"/>
-              </a:buClr>
-              <a:buSzPts val="3200"/>
-              <a:buNone/>
-            </a:pPr>
-            <a:r>
+            <a:fld id="{00000000-1234-1234-1234-123412341234}" type="slidenum">
               <a:rPr lang="en-US"/>
-              <a:t>Joseph L. Hellerstein*</a:t>
-            </a:r>
+              <a:t>‹#›</a:t>
+            </a:fld>
             <a:endParaRPr/>
-          </a:p>
-          <a:p>
-            <a:pPr indent="0" lvl="0" marL="0" rtl="0" algn="ctr">
-              <a:spcBef>
-                <a:spcPts val="640"/>
-              </a:spcBef>
-              <a:spcAft>
-                <a:spcPts val="0"/>
-              </a:spcAft>
-              <a:buClr>
-                <a:srgbClr val="FFFFFF"/>
-              </a:buClr>
-              <a:buSzPts val="3200"/>
-              <a:buNone/>
-            </a:pPr>
-            <a:r>
-              <a:rPr lang="en-US"/>
-              <a:t>Herbert Sauro**</a:t>
-            </a:r>
-            <a:endParaRPr/>
-          </a:p>
-          <a:p>
-            <a:pPr indent="0" lvl="0" marL="0" rtl="0" algn="ctr">
-              <a:spcBef>
-                <a:spcPts val="640"/>
-              </a:spcBef>
-              <a:spcAft>
-                <a:spcPts val="0"/>
-              </a:spcAft>
-              <a:buClr>
-                <a:srgbClr val="FFFFFF"/>
-              </a:buClr>
-              <a:buSzPts val="3200"/>
-              <a:buNone/>
-            </a:pPr>
-            <a:r>
-              <a:t/>
-            </a:r>
-            <a:endParaRPr/>
-          </a:p>
-          <a:p>
-            <a:pPr indent="0" lvl="0" marL="0" rtl="0" algn="ctr">
-              <a:spcBef>
-                <a:spcPts val="560"/>
-              </a:spcBef>
-              <a:spcAft>
-                <a:spcPts val="0"/>
-              </a:spcAft>
-              <a:buClr>
-                <a:srgbClr val="FFFFFF"/>
-              </a:buClr>
-              <a:buSzPts val="2800"/>
-              <a:buNone/>
-            </a:pPr>
-            <a:r>
-              <a:rPr lang="en-US" sz="2800"/>
-              <a:t>*eScience Institute, Computer Science &amp; Engineering</a:t>
-            </a:r>
-            <a:endParaRPr/>
-          </a:p>
-          <a:p>
-            <a:pPr indent="0" lvl="0" marL="0" rtl="0" algn="ctr">
-              <a:spcBef>
-                <a:spcPts val="560"/>
-              </a:spcBef>
-              <a:spcAft>
-                <a:spcPts val="0"/>
-              </a:spcAft>
-              <a:buClr>
-                <a:srgbClr val="FFFFFF"/>
-              </a:buClr>
-              <a:buSzPts val="2800"/>
-              <a:buNone/>
-            </a:pPr>
-            <a:r>
-              <a:rPr lang="en-US" sz="2800"/>
-              <a:t>**BioEngineering</a:t>
-            </a:r>
-            <a:endParaRPr sz="2800"/>
           </a:p>
         </p:txBody>
       </p:sp>
@@ -14473,7 +15346,7 @@
   <p:cSld>
     <p:spTree>
       <p:nvGrpSpPr>
-        <p:cNvPr id="262" name="Shape 262"/>
+        <p:cNvPr id="272" name="Shape 272"/>
         <p:cNvGrpSpPr/>
         <p:nvPr/>
       </p:nvGrpSpPr>
@@ -14487,7 +15360,7 @@
       </p:grpSpPr>
       <p:sp>
         <p:nvSpPr>
-          <p:cNvPr id="263" name="Google Shape;263;p22"/>
+          <p:cNvPr id="273" name="Google Shape;273;p23"/>
           <p:cNvSpPr txBox="1"/>
           <p:nvPr>
             <p:ph type="title"/>
@@ -14531,7 +15404,7 @@
       </p:sp>
       <p:sp>
         <p:nvSpPr>
-          <p:cNvPr id="264" name="Google Shape;264;p22"/>
+          <p:cNvPr id="274" name="Google Shape;274;p23"/>
           <p:cNvSpPr txBox="1"/>
           <p:nvPr>
             <p:ph idx="12" type="sldNum"/>
@@ -14575,7 +15448,7 @@
       </p:sp>
       <p:sp>
         <p:nvSpPr>
-          <p:cNvPr id="265" name="Google Shape;265;p22"/>
+          <p:cNvPr id="275" name="Google Shape;275;p23"/>
           <p:cNvSpPr/>
           <p:nvPr/>
         </p:nvSpPr>
@@ -15165,7 +16038,7 @@
       </p:sp>
       <p:sp>
         <p:nvSpPr>
-          <p:cNvPr id="266" name="Google Shape;266;p22"/>
+          <p:cNvPr id="276" name="Google Shape;276;p23"/>
           <p:cNvSpPr txBox="1"/>
           <p:nvPr/>
         </p:nvSpPr>
@@ -15252,7 +16125,7 @@
                                           </p:stCondLst>
                                         </p:cTn>
                                         <p:tgtEl>
-                                          <p:spTgt spid="266"/>
+                                          <p:spTgt spid="276"/>
                                         </p:tgtEl>
                                         <p:attrNameLst>
                                           <p:attrName>style.visibility</p:attrName>
@@ -15301,7 +16174,7 @@
   <p:cSld>
     <p:spTree>
       <p:nvGrpSpPr>
-        <p:cNvPr id="98" name="Shape 98"/>
+        <p:cNvPr id="108" name="Shape 108"/>
         <p:cNvGrpSpPr/>
         <p:nvPr/>
       </p:nvGrpSpPr>
@@ -15315,7 +16188,7 @@
       </p:grpSpPr>
       <p:sp>
         <p:nvSpPr>
-          <p:cNvPr id="99" name="Google Shape;99;p14"/>
+          <p:cNvPr id="109" name="Google Shape;109;p15"/>
           <p:cNvSpPr txBox="1"/>
           <p:nvPr>
             <p:ph type="title"/>
@@ -15359,7 +16232,7 @@
       </p:sp>
       <p:sp>
         <p:nvSpPr>
-          <p:cNvPr id="100" name="Google Shape;100;p14"/>
+          <p:cNvPr id="110" name="Google Shape;110;p15"/>
           <p:cNvSpPr txBox="1"/>
           <p:nvPr>
             <p:ph idx="12" type="sldNum"/>
@@ -15403,7 +16276,7 @@
       </p:sp>
       <p:pic>
         <p:nvPicPr>
-          <p:cNvPr descr="Diagram&#10;&#10;Description automatically generated" id="101" name="Google Shape;101;p14"/>
+          <p:cNvPr descr="Diagram&#10;&#10;Description automatically generated" id="111" name="Google Shape;111;p15"/>
           <p:cNvPicPr preferRelativeResize="0"/>
           <p:nvPr/>
         </p:nvPicPr>
@@ -15441,7 +16314,7 @@
   <p:cSld>
     <p:spTree>
       <p:nvGrpSpPr>
-        <p:cNvPr id="105" name="Shape 105"/>
+        <p:cNvPr id="115" name="Shape 115"/>
         <p:cNvGrpSpPr/>
         <p:nvPr/>
       </p:nvGrpSpPr>
@@ -15455,7 +16328,7 @@
       </p:grpSpPr>
       <p:sp>
         <p:nvSpPr>
-          <p:cNvPr id="106" name="Google Shape;106;p15"/>
+          <p:cNvPr id="116" name="Google Shape;116;p16"/>
           <p:cNvSpPr txBox="1"/>
           <p:nvPr>
             <p:ph type="title"/>
@@ -15499,7 +16372,7 @@
       </p:sp>
       <p:sp>
         <p:nvSpPr>
-          <p:cNvPr id="107" name="Google Shape;107;p15"/>
+          <p:cNvPr id="117" name="Google Shape;117;p16"/>
           <p:cNvSpPr txBox="1"/>
           <p:nvPr/>
         </p:nvSpPr>
@@ -15549,7 +16422,7 @@
       </p:sp>
       <p:sp>
         <p:nvSpPr>
-          <p:cNvPr id="108" name="Google Shape;108;p15"/>
+          <p:cNvPr id="118" name="Google Shape;118;p16"/>
           <p:cNvSpPr txBox="1"/>
           <p:nvPr/>
         </p:nvSpPr>
@@ -15599,7 +16472,7 @@
       </p:sp>
       <p:sp>
         <p:nvSpPr>
-          <p:cNvPr id="109" name="Google Shape;109;p15"/>
+          <p:cNvPr id="119" name="Google Shape;119;p16"/>
           <p:cNvSpPr/>
           <p:nvPr/>
         </p:nvSpPr>
@@ -15653,7 +16526,7 @@
       </p:sp>
       <p:sp>
         <p:nvSpPr>
-          <p:cNvPr id="110" name="Google Shape;110;p15"/>
+          <p:cNvPr id="120" name="Google Shape;120;p16"/>
           <p:cNvSpPr txBox="1"/>
           <p:nvPr/>
         </p:nvSpPr>
@@ -15707,7 +16580,7 @@
       </p:sp>
       <p:sp>
         <p:nvSpPr>
-          <p:cNvPr id="111" name="Google Shape;111;p15"/>
+          <p:cNvPr id="121" name="Google Shape;121;p16"/>
           <p:cNvSpPr txBox="1"/>
           <p:nvPr/>
         </p:nvSpPr>
@@ -15757,7 +16630,7 @@
       </p:sp>
       <p:sp>
         <p:nvSpPr>
-          <p:cNvPr id="112" name="Google Shape;112;p15"/>
+          <p:cNvPr id="122" name="Google Shape;122;p16"/>
           <p:cNvSpPr txBox="1"/>
           <p:nvPr/>
         </p:nvSpPr>
@@ -15807,7 +16680,7 @@
       </p:sp>
       <p:sp>
         <p:nvSpPr>
-          <p:cNvPr id="113" name="Google Shape;113;p15"/>
+          <p:cNvPr id="123" name="Google Shape;123;p16"/>
           <p:cNvSpPr txBox="1"/>
           <p:nvPr/>
         </p:nvSpPr>
@@ -15857,7 +16730,7 @@
       </p:sp>
       <p:sp>
         <p:nvSpPr>
-          <p:cNvPr id="114" name="Google Shape;114;p15"/>
+          <p:cNvPr id="124" name="Google Shape;124;p16"/>
           <p:cNvSpPr txBox="1"/>
           <p:nvPr/>
         </p:nvSpPr>
@@ -15919,7 +16792,7 @@
       </p:sp>
       <p:sp>
         <p:nvSpPr>
-          <p:cNvPr id="115" name="Google Shape;115;p15"/>
+          <p:cNvPr id="125" name="Google Shape;125;p16"/>
           <p:cNvSpPr txBox="1"/>
           <p:nvPr/>
         </p:nvSpPr>
@@ -15969,10 +16842,10 @@
       </p:sp>
       <p:cxnSp>
         <p:nvCxnSpPr>
-          <p:cNvPr id="116" name="Google Shape;116;p15"/>
+          <p:cNvPr id="126" name="Google Shape;126;p16"/>
           <p:cNvCxnSpPr>
-            <a:stCxn id="113" idx="3"/>
-            <a:endCxn id="109" idx="3"/>
+            <a:stCxn id="123" idx="3"/>
+            <a:endCxn id="119" idx="3"/>
           </p:cNvCxnSpPr>
           <p:nvPr/>
         </p:nvCxnSpPr>
@@ -16007,7 +16880,7 @@
       </p:cxnSp>
       <p:cxnSp>
         <p:nvCxnSpPr>
-          <p:cNvPr id="117" name="Google Shape;117;p15"/>
+          <p:cNvPr id="127" name="Google Shape;127;p16"/>
           <p:cNvCxnSpPr/>
           <p:nvPr/>
         </p:nvCxnSpPr>
@@ -16042,7 +16915,7 @@
       </p:cxnSp>
       <p:cxnSp>
         <p:nvCxnSpPr>
-          <p:cNvPr id="118" name="Google Shape;118;p15"/>
+          <p:cNvPr id="128" name="Google Shape;128;p16"/>
           <p:cNvCxnSpPr/>
           <p:nvPr/>
         </p:nvCxnSpPr>
@@ -16077,9 +16950,9 @@
       </p:cxnSp>
       <p:cxnSp>
         <p:nvCxnSpPr>
-          <p:cNvPr id="119" name="Google Shape;119;p15"/>
+          <p:cNvPr id="129" name="Google Shape;129;p16"/>
           <p:cNvCxnSpPr>
-            <a:stCxn id="115" idx="3"/>
+            <a:stCxn id="125" idx="3"/>
           </p:cNvCxnSpPr>
           <p:nvPr/>
         </p:nvCxnSpPr>
@@ -16112,7 +16985,7 @@
       </p:cxnSp>
       <p:cxnSp>
         <p:nvCxnSpPr>
-          <p:cNvPr id="120" name="Google Shape;120;p15"/>
+          <p:cNvPr id="130" name="Google Shape;130;p16"/>
           <p:cNvCxnSpPr/>
           <p:nvPr/>
         </p:nvCxnSpPr>
@@ -16145,7 +17018,7 @@
       </p:cxnSp>
       <p:cxnSp>
         <p:nvCxnSpPr>
-          <p:cNvPr id="121" name="Google Shape;121;p15"/>
+          <p:cNvPr id="131" name="Google Shape;131;p16"/>
           <p:cNvCxnSpPr/>
           <p:nvPr/>
         </p:nvCxnSpPr>
@@ -16178,7 +17051,7 @@
       </p:cxnSp>
       <p:cxnSp>
         <p:nvCxnSpPr>
-          <p:cNvPr id="122" name="Google Shape;122;p15"/>
+          <p:cNvPr id="132" name="Google Shape;132;p16"/>
           <p:cNvCxnSpPr/>
           <p:nvPr/>
         </p:nvCxnSpPr>
@@ -16211,7 +17084,7 @@
       </p:cxnSp>
       <p:grpSp>
         <p:nvGrpSpPr>
-          <p:cNvPr id="123" name="Google Shape;123;p15"/>
+          <p:cNvPr id="133" name="Google Shape;133;p16"/>
           <p:cNvGrpSpPr/>
           <p:nvPr/>
         </p:nvGrpSpPr>
@@ -16225,7 +17098,7 @@
         </p:grpSpPr>
         <p:pic>
           <p:nvPicPr>
-            <p:cNvPr descr="Linear regression" id="124" name="Google Shape;124;p15"/>
+            <p:cNvPr descr="Linear regression" id="134" name="Google Shape;134;p16"/>
             <p:cNvPicPr preferRelativeResize="0"/>
             <p:nvPr/>
           </p:nvPicPr>
@@ -16252,7 +17125,7 @@
         </p:pic>
         <p:sp>
           <p:nvSpPr>
-            <p:cNvPr id="125" name="Google Shape;125;p15"/>
+            <p:cNvPr id="135" name="Google Shape;135;p16"/>
             <p:cNvSpPr txBox="1"/>
             <p:nvPr/>
           </p:nvSpPr>
@@ -16306,7 +17179,7 @@
         </p:sp>
         <p:sp>
           <p:nvSpPr>
-            <p:cNvPr id="126" name="Google Shape;126;p15"/>
+            <p:cNvPr id="136" name="Google Shape;136;p16"/>
             <p:cNvSpPr txBox="1"/>
             <p:nvPr/>
           </p:nvSpPr>
@@ -16360,7 +17233,7 @@
         </p:sp>
         <p:sp>
           <p:nvSpPr>
-            <p:cNvPr id="127" name="Google Shape;127;p15"/>
+            <p:cNvPr id="137" name="Google Shape;137;p16"/>
             <p:cNvSpPr txBox="1"/>
             <p:nvPr/>
           </p:nvSpPr>
@@ -16410,7 +17283,7 @@
         </p:sp>
         <p:sp>
           <p:nvSpPr>
-            <p:cNvPr id="128" name="Google Shape;128;p15"/>
+            <p:cNvPr id="138" name="Google Shape;138;p16"/>
             <p:cNvSpPr txBox="1"/>
             <p:nvPr/>
           </p:nvSpPr>
@@ -16460,7 +17333,7 @@
         </p:sp>
         <p:sp>
           <p:nvSpPr>
-            <p:cNvPr id="129" name="Google Shape;129;p15"/>
+            <p:cNvPr id="139" name="Google Shape;139;p16"/>
             <p:cNvSpPr txBox="1"/>
             <p:nvPr/>
           </p:nvSpPr>
@@ -16514,7 +17387,7 @@
         </p:sp>
         <p:sp>
           <p:nvSpPr>
-            <p:cNvPr id="130" name="Google Shape;130;p15"/>
+            <p:cNvPr id="140" name="Google Shape;140;p16"/>
             <p:cNvSpPr txBox="1"/>
             <p:nvPr/>
           </p:nvSpPr>
@@ -16569,7 +17442,7 @@
       </p:grpSp>
       <p:sp>
         <p:nvSpPr>
-          <p:cNvPr id="131" name="Google Shape;131;p15"/>
+          <p:cNvPr id="141" name="Google Shape;141;p16"/>
           <p:cNvSpPr txBox="1"/>
           <p:nvPr/>
         </p:nvSpPr>
@@ -16623,7 +17496,7 @@
       </p:sp>
       <p:sp>
         <p:nvSpPr>
-          <p:cNvPr id="132" name="Google Shape;132;p15"/>
+          <p:cNvPr id="142" name="Google Shape;142;p16"/>
           <p:cNvSpPr txBox="1"/>
           <p:nvPr/>
         </p:nvSpPr>
@@ -16677,7 +17550,7 @@
       </p:sp>
       <p:sp>
         <p:nvSpPr>
-          <p:cNvPr id="133" name="Google Shape;133;p15"/>
+          <p:cNvPr id="143" name="Google Shape;143;p16"/>
           <p:cNvSpPr txBox="1"/>
           <p:nvPr/>
         </p:nvSpPr>
@@ -16731,7 +17604,7 @@
       </p:sp>
       <p:sp>
         <p:nvSpPr>
-          <p:cNvPr id="134" name="Google Shape;134;p15"/>
+          <p:cNvPr id="144" name="Google Shape;144;p16"/>
           <p:cNvSpPr txBox="1"/>
           <p:nvPr/>
         </p:nvSpPr>
@@ -16785,7 +17658,7 @@
       </p:sp>
       <p:sp>
         <p:nvSpPr>
-          <p:cNvPr id="135" name="Google Shape;135;p15"/>
+          <p:cNvPr id="145" name="Google Shape;145;p16"/>
           <p:cNvSpPr txBox="1"/>
           <p:nvPr/>
         </p:nvSpPr>
@@ -16876,7 +17749,7 @@
                                           </p:stCondLst>
                                         </p:cTn>
                                         <p:tgtEl>
-                                          <p:spTgt spid="108"/>
+                                          <p:spTgt spid="118"/>
                                         </p:tgtEl>
                                         <p:attrNameLst>
                                           <p:attrName>style.visibility</p:attrName>
@@ -16903,79 +17776,7 @@
                                           </p:stCondLst>
                                         </p:cTn>
                                         <p:tgtEl>
-                                          <p:spTgt spid="110"/>
-                                        </p:tgtEl>
-                                        <p:attrNameLst>
-                                          <p:attrName>style.visibility</p:attrName>
-                                        </p:attrNameLst>
-                                      </p:cBhvr>
-                                      <p:to>
-                                        <p:strVal val="visible"/>
-                                      </p:to>
-                                    </p:set>
-                                  </p:childTnLst>
-                                </p:cTn>
-                              </p:par>
-                            </p:childTnLst>
-                          </p:cTn>
-                        </p:par>
-                      </p:childTnLst>
-                    </p:cTn>
-                  </p:par>
-                  <p:par>
-                    <p:cTn fill="hold">
-                      <p:stCondLst>
-                        <p:cond delay="indefinite"/>
-                      </p:stCondLst>
-                      <p:childTnLst>
-                        <p:par>
-                          <p:cTn fill="hold">
-                            <p:stCondLst>
-                              <p:cond delay="0"/>
-                            </p:stCondLst>
-                            <p:childTnLst>
-                              <p:par>
-                                <p:cTn fill="hold" nodeType="clickEffect" presetClass="entr" presetID="1" presetSubtype="0">
-                                  <p:stCondLst>
-                                    <p:cond delay="0"/>
-                                  </p:stCondLst>
-                                  <p:childTnLst>
-                                    <p:set>
-                                      <p:cBhvr>
-                                        <p:cTn dur="1" fill="hold">
-                                          <p:stCondLst>
-                                            <p:cond delay="0"/>
-                                          </p:stCondLst>
-                                        </p:cTn>
-                                        <p:tgtEl>
-                                          <p:spTgt spid="123"/>
-                                        </p:tgtEl>
-                                        <p:attrNameLst>
-                                          <p:attrName>style.visibility</p:attrName>
-                                        </p:attrNameLst>
-                                      </p:cBhvr>
-                                      <p:to>
-                                        <p:strVal val="visible"/>
-                                      </p:to>
-                                    </p:set>
-                                  </p:childTnLst>
-                                </p:cTn>
-                              </p:par>
-                              <p:par>
-                                <p:cTn fill="hold" nodeType="withEffect" presetClass="entr" presetID="1" presetSubtype="0">
-                                  <p:stCondLst>
-                                    <p:cond delay="0"/>
-                                  </p:stCondLst>
-                                  <p:childTnLst>
-                                    <p:set>
-                                      <p:cBhvr>
-                                        <p:cTn dur="1" fill="hold">
-                                          <p:stCondLst>
-                                            <p:cond delay="0"/>
-                                          </p:stCondLst>
-                                        </p:cTn>
-                                        <p:tgtEl>
-                                          <p:spTgt spid="131"/>
+                                          <p:spTgt spid="120"/>
                                         </p:tgtEl>
                                         <p:attrNameLst>
                                           <p:attrName>style.visibility</p:attrName>
@@ -17047,7 +17848,7 @@
                                           </p:stCondLst>
                                         </p:cTn>
                                         <p:tgtEl>
-                                          <p:spTgt spid="132"/>
+                                          <p:spTgt spid="141"/>
                                         </p:tgtEl>
                                         <p:attrNameLst>
                                           <p:attrName>style.visibility</p:attrName>
@@ -17092,7 +17893,7 @@
                                           </p:stCondLst>
                                         </p:cTn>
                                         <p:tgtEl>
-                                          <p:spTgt spid="134"/>
+                                          <p:spTgt spid="143"/>
                                         </p:tgtEl>
                                         <p:attrNameLst>
                                           <p:attrName>style.visibility</p:attrName>
@@ -17119,7 +17920,79 @@
                                           </p:stCondLst>
                                         </p:cTn>
                                         <p:tgtEl>
-                                          <p:spTgt spid="135"/>
+                                          <p:spTgt spid="142"/>
+                                        </p:tgtEl>
+                                        <p:attrNameLst>
+                                          <p:attrName>style.visibility</p:attrName>
+                                        </p:attrNameLst>
+                                      </p:cBhvr>
+                                      <p:to>
+                                        <p:strVal val="visible"/>
+                                      </p:to>
+                                    </p:set>
+                                  </p:childTnLst>
+                                </p:cTn>
+                              </p:par>
+                            </p:childTnLst>
+                          </p:cTn>
+                        </p:par>
+                      </p:childTnLst>
+                    </p:cTn>
+                  </p:par>
+                  <p:par>
+                    <p:cTn fill="hold">
+                      <p:stCondLst>
+                        <p:cond delay="indefinite"/>
+                      </p:stCondLst>
+                      <p:childTnLst>
+                        <p:par>
+                          <p:cTn fill="hold">
+                            <p:stCondLst>
+                              <p:cond delay="0"/>
+                            </p:stCondLst>
+                            <p:childTnLst>
+                              <p:par>
+                                <p:cTn fill="hold" nodeType="clickEffect" presetClass="entr" presetID="1" presetSubtype="0">
+                                  <p:stCondLst>
+                                    <p:cond delay="0"/>
+                                  </p:stCondLst>
+                                  <p:childTnLst>
+                                    <p:set>
+                                      <p:cBhvr>
+                                        <p:cTn dur="1" fill="hold">
+                                          <p:stCondLst>
+                                            <p:cond delay="0"/>
+                                          </p:stCondLst>
+                                        </p:cTn>
+                                        <p:tgtEl>
+                                          <p:spTgt spid="144"/>
+                                        </p:tgtEl>
+                                        <p:attrNameLst>
+                                          <p:attrName>style.visibility</p:attrName>
+                                        </p:attrNameLst>
+                                      </p:cBhvr>
+                                      <p:to>
+                                        <p:strVal val="visible"/>
+                                      </p:to>
+                                    </p:set>
+                                  </p:childTnLst>
+                                </p:cTn>
+                              </p:par>
+                              <p:par>
+                                <p:cTn fill="hold" nodeType="withEffect" presetClass="entr" presetID="1" presetSubtype="0">
+                                  <p:stCondLst>
+                                    <p:cond delay="0"/>
+                                  </p:stCondLst>
+                                  <p:childTnLst>
+                                    <p:set>
+                                      <p:cBhvr>
+                                        <p:cTn dur="1" fill="hold">
+                                          <p:stCondLst>
+                                            <p:cond delay="0"/>
+                                          </p:stCondLst>
+                                        </p:cTn>
+                                        <p:tgtEl>
+                                          <p:spTgt spid="145"/>
                                         </p:tgtEl>
                                         <p:attrNameLst>
                                           <p:attrName>style.visibility</p:attrName>
@@ -17168,7 +18041,7 @@
   <p:cSld>
     <p:spTree>
       <p:nvGrpSpPr>
-        <p:cNvPr id="139" name="Shape 139"/>
+        <p:cNvPr id="149" name="Shape 149"/>
         <p:cNvGrpSpPr/>
         <p:nvPr/>
       </p:nvGrpSpPr>
@@ -17182,7 +18055,7 @@
       </p:grpSpPr>
       <p:sp>
         <p:nvSpPr>
-          <p:cNvPr id="140" name="Google Shape;140;p16"/>
+          <p:cNvPr id="150" name="Google Shape;150;p17"/>
           <p:cNvSpPr txBox="1"/>
           <p:nvPr>
             <p:ph type="title"/>
@@ -17226,7 +18099,7 @@
       </p:sp>
       <p:sp>
         <p:nvSpPr>
-          <p:cNvPr id="141" name="Google Shape;141;p16"/>
+          <p:cNvPr id="151" name="Google Shape;151;p17"/>
           <p:cNvSpPr txBox="1"/>
           <p:nvPr>
             <p:ph idx="1" type="body"/>
@@ -17362,7 +18235,7 @@
       </p:sp>
       <p:sp>
         <p:nvSpPr>
-          <p:cNvPr id="142" name="Google Shape;142;p16"/>
+          <p:cNvPr id="152" name="Google Shape;152;p17"/>
           <p:cNvSpPr txBox="1"/>
           <p:nvPr>
             <p:ph idx="12" type="sldNum"/>
@@ -17417,7 +18290,7 @@
   <p:cSld>
     <p:spTree>
       <p:nvGrpSpPr>
-        <p:cNvPr id="146" name="Shape 146"/>
+        <p:cNvPr id="156" name="Shape 156"/>
         <p:cNvGrpSpPr/>
         <p:nvPr/>
       </p:nvGrpSpPr>
@@ -17431,7 +18304,7 @@
       </p:grpSpPr>
       <p:sp>
         <p:nvSpPr>
-          <p:cNvPr id="147" name="Google Shape;147;p17"/>
+          <p:cNvPr id="157" name="Google Shape;157;p18"/>
           <p:cNvSpPr txBox="1"/>
           <p:nvPr>
             <p:ph type="title"/>
@@ -17482,7 +18355,7 @@
       </p:sp>
       <p:sp>
         <p:nvSpPr>
-          <p:cNvPr id="148" name="Google Shape;148;p17"/>
+          <p:cNvPr id="158" name="Google Shape;158;p18"/>
           <p:cNvSpPr txBox="1"/>
           <p:nvPr>
             <p:ph idx="1" type="body"/>
@@ -17610,7 +18483,7 @@
       </p:sp>
       <p:sp>
         <p:nvSpPr>
-          <p:cNvPr id="149" name="Google Shape;149;p17"/>
+          <p:cNvPr id="159" name="Google Shape;159;p18"/>
           <p:cNvSpPr txBox="1"/>
           <p:nvPr>
             <p:ph idx="12" type="sldNum"/>
@@ -17654,7 +18527,7 @@
       </p:sp>
       <p:grpSp>
         <p:nvGrpSpPr>
-          <p:cNvPr id="150" name="Google Shape;150;p17"/>
+          <p:cNvPr id="160" name="Google Shape;160;p18"/>
           <p:cNvGrpSpPr/>
           <p:nvPr/>
         </p:nvGrpSpPr>
@@ -17668,7 +18541,7 @@
         </p:grpSpPr>
         <p:pic>
           <p:nvPicPr>
-            <p:cNvPr id="151" name="Google Shape;151;p17"/>
+            <p:cNvPr id="161" name="Google Shape;161;p18"/>
             <p:cNvPicPr preferRelativeResize="0"/>
             <p:nvPr/>
           </p:nvPicPr>
@@ -17695,7 +18568,7 @@
         </p:pic>
         <p:sp>
           <p:nvSpPr>
-            <p:cNvPr id="152" name="Google Shape;152;p17"/>
+            <p:cNvPr id="162" name="Google Shape;162;p18"/>
             <p:cNvSpPr txBox="1"/>
             <p:nvPr/>
           </p:nvSpPr>
@@ -17746,7 +18619,7 @@
       </p:grpSp>
       <p:grpSp>
         <p:nvGrpSpPr>
-          <p:cNvPr id="153" name="Google Shape;153;p17"/>
+          <p:cNvPr id="163" name="Google Shape;163;p18"/>
           <p:cNvGrpSpPr/>
           <p:nvPr/>
         </p:nvGrpSpPr>
@@ -17760,7 +18633,7 @@
         </p:grpSpPr>
         <p:pic>
           <p:nvPicPr>
-            <p:cNvPr id="154" name="Google Shape;154;p17"/>
+            <p:cNvPr id="164" name="Google Shape;164;p18"/>
             <p:cNvPicPr preferRelativeResize="0"/>
             <p:nvPr/>
           </p:nvPicPr>
@@ -17789,7 +18662,7 @@
         </p:pic>
         <p:sp>
           <p:nvSpPr>
-            <p:cNvPr id="155" name="Google Shape;155;p17"/>
+            <p:cNvPr id="165" name="Google Shape;165;p18"/>
             <p:cNvSpPr txBox="1"/>
             <p:nvPr/>
           </p:nvSpPr>
@@ -17840,7 +18713,7 @@
       </p:grpSp>
       <p:grpSp>
         <p:nvGrpSpPr>
-          <p:cNvPr id="156" name="Google Shape;156;p17"/>
+          <p:cNvPr id="166" name="Google Shape;166;p18"/>
           <p:cNvGrpSpPr/>
           <p:nvPr/>
         </p:nvGrpSpPr>
@@ -17854,7 +18727,7 @@
         </p:grpSpPr>
         <p:pic>
           <p:nvPicPr>
-            <p:cNvPr id="157" name="Google Shape;157;p17"/>
+            <p:cNvPr id="167" name="Google Shape;167;p18"/>
             <p:cNvPicPr preferRelativeResize="0"/>
             <p:nvPr/>
           </p:nvPicPr>
@@ -17881,7 +18754,7 @@
         </p:pic>
         <p:sp>
           <p:nvSpPr>
-            <p:cNvPr id="158" name="Google Shape;158;p17"/>
+            <p:cNvPr id="168" name="Google Shape;168;p18"/>
             <p:cNvSpPr txBox="1"/>
             <p:nvPr/>
           </p:nvSpPr>
@@ -17969,7 +18842,7 @@
                                           </p:stCondLst>
                                         </p:cTn>
                                         <p:tgtEl>
-                                          <p:spTgt spid="150"/>
+                                          <p:spTgt spid="160"/>
                                         </p:tgtEl>
                                         <p:attrNameLst>
                                           <p:attrName>style.visibility</p:attrName>
@@ -18014,7 +18887,7 @@
                                           </p:stCondLst>
                                         </p:cTn>
                                         <p:tgtEl>
-                                          <p:spTgt spid="156"/>
+                                          <p:spTgt spid="166"/>
                                         </p:tgtEl>
                                         <p:attrNameLst>
                                           <p:attrName>style.visibility</p:attrName>
@@ -18059,7 +18932,7 @@
                                           </p:stCondLst>
                                         </p:cTn>
                                         <p:tgtEl>
-                                          <p:spTgt spid="153"/>
+                                          <p:spTgt spid="163"/>
                                         </p:tgtEl>
                                         <p:attrNameLst>
                                           <p:attrName>style.visibility</p:attrName>
@@ -18104,7 +18977,7 @@
                                           </p:stCondLst>
                                         </p:cTn>
                                         <p:tgtEl>
-                                          <p:spTgt spid="148">
+                                          <p:spTgt spid="158">
                                             <p:txEl>
                                               <p:pRg end="0" st="0"/>
                                             </p:txEl>
@@ -18153,7 +19026,7 @@
                                           </p:stCondLst>
                                         </p:cTn>
                                         <p:tgtEl>
-                                          <p:spTgt spid="148">
+                                          <p:spTgt spid="158">
                                             <p:txEl>
                                               <p:pRg end="1" st="1"/>
                                             </p:txEl>
@@ -18202,7 +19075,7 @@
                                           </p:stCondLst>
                                         </p:cTn>
                                         <p:tgtEl>
-                                          <p:spTgt spid="148">
+                                          <p:spTgt spid="158">
                                             <p:txEl>
                                               <p:pRg end="2" st="2"/>
                                             </p:txEl>
@@ -18251,7 +19124,7 @@
                                           </p:stCondLst>
                                         </p:cTn>
                                         <p:tgtEl>
-                                          <p:spTgt spid="148">
+                                          <p:spTgt spid="158">
                                             <p:txEl>
                                               <p:pRg end="3" st="3"/>
                                             </p:txEl>
@@ -18300,7 +19173,7 @@
                                           </p:stCondLst>
                                         </p:cTn>
                                         <p:tgtEl>
-                                          <p:spTgt spid="148">
+                                          <p:spTgt spid="158">
                                             <p:txEl>
                                               <p:pRg end="4" st="4"/>
                                             </p:txEl>
@@ -18353,7 +19226,7 @@
   <p:cSld>
     <p:spTree>
       <p:nvGrpSpPr>
-        <p:cNvPr id="162" name="Shape 162"/>
+        <p:cNvPr id="172" name="Shape 172"/>
         <p:cNvGrpSpPr/>
         <p:nvPr/>
       </p:nvGrpSpPr>
@@ -18367,7 +19240,7 @@
       </p:grpSpPr>
       <p:sp>
         <p:nvSpPr>
-          <p:cNvPr id="163" name="Google Shape;163;p18"/>
+          <p:cNvPr id="173" name="Google Shape;173;p19"/>
           <p:cNvSpPr txBox="1"/>
           <p:nvPr>
             <p:ph type="title"/>
@@ -18411,7 +19284,7 @@
       </p:sp>
       <p:sp>
         <p:nvSpPr>
-          <p:cNvPr id="164" name="Google Shape;164;p18"/>
+          <p:cNvPr id="174" name="Google Shape;174;p19"/>
           <p:cNvSpPr txBox="1"/>
           <p:nvPr>
             <p:ph idx="12" type="sldNum"/>
@@ -18466,7 +19339,7 @@
   <p:cSld>
     <p:spTree>
       <p:nvGrpSpPr>
-        <p:cNvPr id="168" name="Shape 168"/>
+        <p:cNvPr id="178" name="Shape 178"/>
         <p:cNvGrpSpPr/>
         <p:nvPr/>
       </p:nvGrpSpPr>
@@ -18480,7 +19353,7 @@
       </p:grpSpPr>
       <p:sp>
         <p:nvSpPr>
-          <p:cNvPr id="169" name="Google Shape;169;p19"/>
+          <p:cNvPr id="179" name="Google Shape;179;p20"/>
           <p:cNvSpPr txBox="1"/>
           <p:nvPr>
             <p:ph type="title"/>
@@ -18531,7 +19404,7 @@
       </p:sp>
       <p:sp>
         <p:nvSpPr>
-          <p:cNvPr id="170" name="Google Shape;170;p19"/>
+          <p:cNvPr id="180" name="Google Shape;180;p20"/>
           <p:cNvSpPr txBox="1"/>
           <p:nvPr>
             <p:ph idx="1" type="body"/>
@@ -18583,7 +19456,7 @@
       </p:sp>
       <p:sp>
         <p:nvSpPr>
-          <p:cNvPr id="171" name="Google Shape;171;p19"/>
+          <p:cNvPr id="181" name="Google Shape;181;p20"/>
           <p:cNvSpPr txBox="1"/>
           <p:nvPr>
             <p:ph idx="12" type="sldNum"/>
@@ -18627,7 +19500,7 @@
       </p:sp>
       <p:graphicFrame>
         <p:nvGraphicFramePr>
-          <p:cNvPr id="172" name="Google Shape;172;p19"/>
+          <p:cNvPr id="182" name="Google Shape;182;p20"/>
           <p:cNvGraphicFramePr/>
           <p:nvPr/>
         </p:nvGraphicFramePr>
@@ -18640,7 +19513,7 @@
             <a:tbl>
               <a:tblPr bandRow="1" firstRow="1">
                 <a:noFill/>
-                <a:tableStyleId>{E1D86C35-96E0-43DC-B862-F6F609612BB4}</a:tableStyleId>
+                <a:tableStyleId>{A784A354-D9E3-495A-ADCC-CCC4445DDEA2}</a:tableStyleId>
               </a:tblPr>
               <a:tblGrid>
                 <a:gridCol w="1981200"/>
@@ -19110,7 +19983,7 @@
       </p:graphicFrame>
       <p:pic>
         <p:nvPicPr>
-          <p:cNvPr id="173" name="Google Shape;173;p19"/>
+          <p:cNvPr id="183" name="Google Shape;183;p20"/>
           <p:cNvPicPr preferRelativeResize="0"/>
           <p:nvPr/>
         </p:nvPicPr>
@@ -19137,7 +20010,7 @@
       </p:pic>
       <p:pic>
         <p:nvPicPr>
-          <p:cNvPr id="174" name="Google Shape;174;p19"/>
+          <p:cNvPr id="184" name="Google Shape;184;p20"/>
           <p:cNvPicPr preferRelativeResize="0"/>
           <p:nvPr/>
         </p:nvPicPr>
@@ -19164,7 +20037,7 @@
       </p:pic>
       <p:pic>
         <p:nvPicPr>
-          <p:cNvPr id="175" name="Google Shape;175;p19"/>
+          <p:cNvPr id="185" name="Google Shape;185;p20"/>
           <p:cNvPicPr preferRelativeResize="0"/>
           <p:nvPr/>
         </p:nvPicPr>
@@ -19191,7 +20064,7 @@
       </p:pic>
       <p:pic>
         <p:nvPicPr>
-          <p:cNvPr id="176" name="Google Shape;176;p19"/>
+          <p:cNvPr id="186" name="Google Shape;186;p20"/>
           <p:cNvPicPr preferRelativeResize="0"/>
           <p:nvPr/>
         </p:nvPicPr>
@@ -19218,7 +20091,7 @@
       </p:pic>
       <p:pic>
         <p:nvPicPr>
-          <p:cNvPr id="177" name="Google Shape;177;p19"/>
+          <p:cNvPr id="187" name="Google Shape;187;p20"/>
           <p:cNvPicPr preferRelativeResize="0"/>
           <p:nvPr/>
         </p:nvPicPr>
@@ -19245,7 +20118,7 @@
       </p:pic>
       <p:pic>
         <p:nvPicPr>
-          <p:cNvPr id="178" name="Google Shape;178;p19"/>
+          <p:cNvPr id="188" name="Google Shape;188;p20"/>
           <p:cNvPicPr preferRelativeResize="0"/>
           <p:nvPr/>
         </p:nvPicPr>
@@ -19272,7 +20145,7 @@
       </p:pic>
       <p:pic>
         <p:nvPicPr>
-          <p:cNvPr id="179" name="Google Shape;179;p19"/>
+          <p:cNvPr id="189" name="Google Shape;189;p20"/>
           <p:cNvPicPr preferRelativeResize="0"/>
           <p:nvPr/>
         </p:nvPicPr>
@@ -19299,7 +20172,7 @@
       </p:pic>
       <p:pic>
         <p:nvPicPr>
-          <p:cNvPr id="180" name="Google Shape;180;p19"/>
+          <p:cNvPr id="190" name="Google Shape;190;p20"/>
           <p:cNvPicPr preferRelativeResize="0"/>
           <p:nvPr/>
         </p:nvPicPr>
@@ -19326,7 +20199,7 @@
       </p:pic>
       <p:pic>
         <p:nvPicPr>
-          <p:cNvPr id="181" name="Google Shape;181;p19"/>
+          <p:cNvPr id="191" name="Google Shape;191;p20"/>
           <p:cNvPicPr preferRelativeResize="0"/>
           <p:nvPr/>
         </p:nvPicPr>
@@ -19353,7 +20226,7 @@
       </p:pic>
       <p:pic>
         <p:nvPicPr>
-          <p:cNvPr id="182" name="Google Shape;182;p19"/>
+          <p:cNvPr id="192" name="Google Shape;192;p20"/>
           <p:cNvPicPr preferRelativeResize="0"/>
           <p:nvPr/>
         </p:nvPicPr>
@@ -19380,7 +20253,7 @@
       </p:pic>
       <p:pic>
         <p:nvPicPr>
-          <p:cNvPr id="183" name="Google Shape;183;p19"/>
+          <p:cNvPr id="193" name="Google Shape;193;p20"/>
           <p:cNvPicPr preferRelativeResize="0"/>
           <p:nvPr/>
         </p:nvPicPr>
@@ -19407,7 +20280,7 @@
       </p:pic>
       <p:pic>
         <p:nvPicPr>
-          <p:cNvPr id="184" name="Google Shape;184;p19"/>
+          <p:cNvPr id="194" name="Google Shape;194;p20"/>
           <p:cNvPicPr preferRelativeResize="0"/>
           <p:nvPr/>
         </p:nvPicPr>
@@ -19434,7 +20307,7 @@
       </p:pic>
       <p:sp>
         <p:nvSpPr>
-          <p:cNvPr id="185" name="Google Shape;185;p19"/>
+          <p:cNvPr id="195" name="Google Shape;195;p20"/>
           <p:cNvSpPr/>
           <p:nvPr/>
         </p:nvSpPr>
@@ -19483,7 +20356,7 @@
       </p:sp>
       <p:pic>
         <p:nvPicPr>
-          <p:cNvPr descr="R^2" id="186" name="Google Shape;186;p19" title="MathEquation,#000000"/>
+          <p:cNvPr descr="R^2" id="196" name="Google Shape;196;p20" title="MathEquation,#000000"/>
           <p:cNvPicPr preferRelativeResize="0"/>
           <p:nvPr/>
         </p:nvPicPr>
@@ -19511,7 +20384,7 @@
       </p:pic>
       <p:pic>
         <p:nvPicPr>
-          <p:cNvPr descr="\chi^2" id="187" name="Google Shape;187;p19" title="MathEquation,#000000"/>
+          <p:cNvPr descr="\chi^2" id="197" name="Google Shape;197;p20" title="MathEquation,#000000"/>
           <p:cNvPicPr preferRelativeResize="0"/>
           <p:nvPr/>
         </p:nvPicPr>
@@ -19539,7 +20412,7 @@
       </p:pic>
       <p:sp>
         <p:nvSpPr>
-          <p:cNvPr id="188" name="Google Shape;188;p19"/>
+          <p:cNvPr id="198" name="Google Shape;198;p20"/>
           <p:cNvSpPr txBox="1"/>
           <p:nvPr/>
         </p:nvSpPr>
@@ -19592,7 +20465,7 @@
   <p:cSld>
     <p:spTree>
       <p:nvGrpSpPr>
-        <p:cNvPr id="193" name="Shape 193"/>
+        <p:cNvPr id="203" name="Shape 203"/>
         <p:cNvGrpSpPr/>
         <p:nvPr/>
       </p:nvGrpSpPr>
@@ -19606,7 +20479,7 @@
       </p:grpSpPr>
       <p:sp>
         <p:nvSpPr>
-          <p:cNvPr id="194" name="Google Shape;194;p20"/>
+          <p:cNvPr id="204" name="Google Shape;204;p21"/>
           <p:cNvSpPr txBox="1"/>
           <p:nvPr>
             <p:ph type="title"/>
@@ -19650,7 +20523,7 @@
       </p:sp>
       <p:sp>
         <p:nvSpPr>
-          <p:cNvPr id="195" name="Google Shape;195;p20"/>
+          <p:cNvPr id="205" name="Google Shape;205;p21"/>
           <p:cNvSpPr txBox="1"/>
           <p:nvPr>
             <p:ph idx="12" type="sldNum"/>
@@ -19694,7 +20567,7 @@
       </p:sp>
       <p:sp>
         <p:nvSpPr>
-          <p:cNvPr id="196" name="Google Shape;196;p20"/>
+          <p:cNvPr id="206" name="Google Shape;206;p21"/>
           <p:cNvSpPr/>
           <p:nvPr/>
         </p:nvSpPr>
@@ -19791,7 +20664,7 @@
       </p:sp>
       <p:sp>
         <p:nvSpPr>
-          <p:cNvPr id="197" name="Google Shape;197;p20"/>
+          <p:cNvPr id="207" name="Google Shape;207;p21"/>
           <p:cNvSpPr/>
           <p:nvPr/>
         </p:nvSpPr>
@@ -19912,7 +20785,7 @@
       </p:sp>
       <p:sp>
         <p:nvSpPr>
-          <p:cNvPr id="198" name="Google Shape;198;p20"/>
+          <p:cNvPr id="208" name="Google Shape;208;p21"/>
           <p:cNvSpPr/>
           <p:nvPr/>
         </p:nvSpPr>
@@ -20009,7 +20882,7 @@
       </p:sp>
       <p:sp>
         <p:nvSpPr>
-          <p:cNvPr id="199" name="Google Shape;199;p20"/>
+          <p:cNvPr id="209" name="Google Shape;209;p21"/>
           <p:cNvSpPr/>
           <p:nvPr/>
         </p:nvSpPr>
@@ -20082,7 +20955,7 @@
       </p:sp>
       <p:cxnSp>
         <p:nvCxnSpPr>
-          <p:cNvPr id="200" name="Google Shape;200;p20"/>
+          <p:cNvPr id="210" name="Google Shape;210;p21"/>
           <p:cNvCxnSpPr/>
           <p:nvPr/>
         </p:nvCxnSpPr>
@@ -20115,7 +20988,7 @@
       </p:cxnSp>
       <p:cxnSp>
         <p:nvCxnSpPr>
-          <p:cNvPr id="201" name="Google Shape;201;p20"/>
+          <p:cNvPr id="211" name="Google Shape;211;p21"/>
           <p:cNvCxnSpPr/>
           <p:nvPr/>
         </p:nvCxnSpPr>
@@ -20148,7 +21021,7 @@
       </p:cxnSp>
       <p:graphicFrame>
         <p:nvGraphicFramePr>
-          <p:cNvPr id="202" name="Google Shape;202;p20"/>
+          <p:cNvPr id="212" name="Google Shape;212;p21"/>
           <p:cNvGraphicFramePr/>
           <p:nvPr/>
         </p:nvGraphicFramePr>
@@ -20161,7 +21034,7 @@
             <a:tbl>
               <a:tblPr bandRow="1" firstRow="1">
                 <a:noFill/>
-                <a:tableStyleId>{E1D86C35-96E0-43DC-B862-F6F609612BB4}</a:tableStyleId>
+                <a:tableStyleId>{A784A354-D9E3-495A-ADCC-CCC4445DDEA2}</a:tableStyleId>
               </a:tblPr>
               <a:tblGrid>
                 <a:gridCol w="208275"/>
@@ -20867,7 +21740,7 @@
       </p:graphicFrame>
       <p:sp>
         <p:nvSpPr>
-          <p:cNvPr id="203" name="Google Shape;203;p20"/>
+          <p:cNvPr id="213" name="Google Shape;213;p21"/>
           <p:cNvSpPr txBox="1"/>
           <p:nvPr/>
         </p:nvSpPr>
@@ -20917,7 +21790,7 @@
       </p:sp>
       <p:sp>
         <p:nvSpPr>
-          <p:cNvPr id="204" name="Google Shape;204;p20"/>
+          <p:cNvPr id="214" name="Google Shape;214;p21"/>
           <p:cNvSpPr txBox="1"/>
           <p:nvPr/>
         </p:nvSpPr>
@@ -20967,7 +21840,7 @@
       </p:sp>
       <p:sp>
         <p:nvSpPr>
-          <p:cNvPr id="205" name="Google Shape;205;p20"/>
+          <p:cNvPr id="215" name="Google Shape;215;p21"/>
           <p:cNvSpPr txBox="1"/>
           <p:nvPr/>
         </p:nvSpPr>
@@ -21021,7 +21894,7 @@
       </p:sp>
       <p:sp>
         <p:nvSpPr>
-          <p:cNvPr id="206" name="Google Shape;206;p20"/>
+          <p:cNvPr id="216" name="Google Shape;216;p21"/>
           <p:cNvSpPr txBox="1"/>
           <p:nvPr/>
         </p:nvSpPr>
@@ -21075,7 +21948,7 @@
       </p:sp>
       <p:sp>
         <p:nvSpPr>
-          <p:cNvPr id="207" name="Google Shape;207;p20"/>
+          <p:cNvPr id="217" name="Google Shape;217;p21"/>
           <p:cNvSpPr txBox="1"/>
           <p:nvPr/>
         </p:nvSpPr>
@@ -21129,9 +22002,9 @@
       </p:sp>
       <p:cxnSp>
         <p:nvCxnSpPr>
-          <p:cNvPr id="208" name="Google Shape;208;p20"/>
+          <p:cNvPr id="218" name="Google Shape;218;p21"/>
           <p:cNvCxnSpPr>
-            <a:stCxn id="197" idx="2"/>
+            <a:stCxn id="207" idx="2"/>
           </p:cNvCxnSpPr>
           <p:nvPr/>
         </p:nvCxnSpPr>
@@ -21164,7 +22037,7 @@
       </p:cxnSp>
       <p:graphicFrame>
         <p:nvGraphicFramePr>
-          <p:cNvPr id="209" name="Google Shape;209;p20"/>
+          <p:cNvPr id="219" name="Google Shape;219;p21"/>
           <p:cNvGraphicFramePr/>
           <p:nvPr/>
         </p:nvGraphicFramePr>
@@ -21177,7 +22050,7 @@
             <a:tbl>
               <a:tblPr bandRow="1" firstRow="1">
                 <a:noFill/>
-                <a:tableStyleId>{E1D86C35-96E0-43DC-B862-F6F609612BB4}</a:tableStyleId>
+                <a:tableStyleId>{A784A354-D9E3-495A-ADCC-CCC4445DDEA2}</a:tableStyleId>
               </a:tblPr>
               <a:tblGrid>
                 <a:gridCol w="208275"/>
@@ -21671,7 +22544,7 @@
       </p:graphicFrame>
       <p:graphicFrame>
         <p:nvGraphicFramePr>
-          <p:cNvPr id="210" name="Google Shape;210;p20"/>
+          <p:cNvPr id="220" name="Google Shape;220;p21"/>
           <p:cNvGraphicFramePr/>
           <p:nvPr/>
         </p:nvGraphicFramePr>
@@ -21684,7 +22557,7 @@
             <a:tbl>
               <a:tblPr bandRow="1" firstRow="1">
                 <a:noFill/>
-                <a:tableStyleId>{E1D86C35-96E0-43DC-B862-F6F609612BB4}</a:tableStyleId>
+                <a:tableStyleId>{A784A354-D9E3-495A-ADCC-CCC4445DDEA2}</a:tableStyleId>
               </a:tblPr>
               <a:tblGrid>
                 <a:gridCol w="208275"/>
@@ -21910,7 +22783,7 @@
       </p:graphicFrame>
       <p:sp>
         <p:nvSpPr>
-          <p:cNvPr id="211" name="Google Shape;211;p20"/>
+          <p:cNvPr id="221" name="Google Shape;221;p21"/>
           <p:cNvSpPr txBox="1"/>
           <p:nvPr/>
         </p:nvSpPr>
@@ -21960,7 +22833,7 @@
       </p:sp>
       <p:sp>
         <p:nvSpPr>
-          <p:cNvPr id="212" name="Google Shape;212;p20"/>
+          <p:cNvPr id="222" name="Google Shape;222;p21"/>
           <p:cNvSpPr txBox="1"/>
           <p:nvPr/>
         </p:nvSpPr>
@@ -22010,7 +22883,7 @@
       </p:sp>
       <p:graphicFrame>
         <p:nvGraphicFramePr>
-          <p:cNvPr id="213" name="Google Shape;213;p20"/>
+          <p:cNvPr id="223" name="Google Shape;223;p21"/>
           <p:cNvGraphicFramePr/>
           <p:nvPr/>
         </p:nvGraphicFramePr>
@@ -22023,7 +22896,7 @@
             <a:tbl>
               <a:tblPr bandRow="1" firstRow="1">
                 <a:noFill/>
-                <a:tableStyleId>{E1D86C35-96E0-43DC-B862-F6F609612BB4}</a:tableStyleId>
+                <a:tableStyleId>{A784A354-D9E3-495A-ADCC-CCC4445DDEA2}</a:tableStyleId>
               </a:tblPr>
               <a:tblGrid>
                 <a:gridCol w="208275"/>
@@ -22517,7 +23390,7 @@
       </p:graphicFrame>
       <p:graphicFrame>
         <p:nvGraphicFramePr>
-          <p:cNvPr id="214" name="Google Shape;214;p20"/>
+          <p:cNvPr id="224" name="Google Shape;224;p21"/>
           <p:cNvGraphicFramePr/>
           <p:nvPr/>
         </p:nvGraphicFramePr>
@@ -22530,7 +23403,7 @@
             <a:tbl>
               <a:tblPr bandRow="1" firstRow="1">
                 <a:noFill/>
-                <a:tableStyleId>{E1D86C35-96E0-43DC-B862-F6F609612BB4}</a:tableStyleId>
+                <a:tableStyleId>{A784A354-D9E3-495A-ADCC-CCC4445DDEA2}</a:tableStyleId>
               </a:tblPr>
               <a:tblGrid>
                 <a:gridCol w="208275"/>
@@ -22756,7 +23629,7 @@
       </p:graphicFrame>
       <p:sp>
         <p:nvSpPr>
-          <p:cNvPr id="215" name="Google Shape;215;p20"/>
+          <p:cNvPr id="225" name="Google Shape;225;p21"/>
           <p:cNvSpPr txBox="1"/>
           <p:nvPr/>
         </p:nvSpPr>
@@ -22806,7 +23679,7 @@
       </p:sp>
       <p:sp>
         <p:nvSpPr>
-          <p:cNvPr id="216" name="Google Shape;216;p20"/>
+          <p:cNvPr id="226" name="Google Shape;226;p21"/>
           <p:cNvSpPr txBox="1"/>
           <p:nvPr/>
         </p:nvSpPr>
@@ -22856,7 +23729,7 @@
       </p:sp>
       <p:graphicFrame>
         <p:nvGraphicFramePr>
-          <p:cNvPr id="217" name="Google Shape;217;p20"/>
+          <p:cNvPr id="227" name="Google Shape;227;p21"/>
           <p:cNvGraphicFramePr/>
           <p:nvPr/>
         </p:nvGraphicFramePr>
@@ -22869,7 +23742,7 @@
             <a:tbl>
               <a:tblPr bandRow="1" firstRow="1">
                 <a:noFill/>
-                <a:tableStyleId>{E1D86C35-96E0-43DC-B862-F6F609612BB4}</a:tableStyleId>
+                <a:tableStyleId>{A784A354-D9E3-495A-ADCC-CCC4445DDEA2}</a:tableStyleId>
               </a:tblPr>
               <a:tblGrid>
                 <a:gridCol w="208275"/>
@@ -23363,7 +24236,7 @@
       </p:graphicFrame>
       <p:graphicFrame>
         <p:nvGraphicFramePr>
-          <p:cNvPr id="218" name="Google Shape;218;p20"/>
+          <p:cNvPr id="228" name="Google Shape;228;p21"/>
           <p:cNvGraphicFramePr/>
           <p:nvPr/>
         </p:nvGraphicFramePr>
@@ -23376,7 +24249,7 @@
             <a:tbl>
               <a:tblPr bandRow="1" firstRow="1">
                 <a:noFill/>
-                <a:tableStyleId>{E1D86C35-96E0-43DC-B862-F6F609612BB4}</a:tableStyleId>
+                <a:tableStyleId>{A784A354-D9E3-495A-ADCC-CCC4445DDEA2}</a:tableStyleId>
               </a:tblPr>
               <a:tblGrid>
                 <a:gridCol w="208275"/>
@@ -23602,7 +24475,7 @@
       </p:graphicFrame>
       <p:sp>
         <p:nvSpPr>
-          <p:cNvPr id="219" name="Google Shape;219;p20"/>
+          <p:cNvPr id="229" name="Google Shape;229;p21"/>
           <p:cNvSpPr txBox="1"/>
           <p:nvPr/>
         </p:nvSpPr>
@@ -23656,7 +24529,7 @@
       </p:sp>
       <p:cxnSp>
         <p:nvCxnSpPr>
-          <p:cNvPr id="220" name="Google Shape;220;p20"/>
+          <p:cNvPr id="230" name="Google Shape;230;p21"/>
           <p:cNvCxnSpPr/>
           <p:nvPr/>
         </p:nvCxnSpPr>
@@ -23689,7 +24562,7 @@
       </p:cxnSp>
       <p:cxnSp>
         <p:nvCxnSpPr>
-          <p:cNvPr id="221" name="Google Shape;221;p20"/>
+          <p:cNvPr id="231" name="Google Shape;231;p21"/>
           <p:cNvCxnSpPr/>
           <p:nvPr/>
         </p:nvCxnSpPr>
@@ -23722,7 +24595,7 @@
       </p:cxnSp>
       <p:cxnSp>
         <p:nvCxnSpPr>
-          <p:cNvPr id="222" name="Google Shape;222;p20"/>
+          <p:cNvPr id="232" name="Google Shape;232;p21"/>
           <p:cNvCxnSpPr/>
           <p:nvPr/>
         </p:nvCxnSpPr>
@@ -23755,7 +24628,7 @@
       </p:cxnSp>
       <p:cxnSp>
         <p:nvCxnSpPr>
-          <p:cNvPr id="223" name="Google Shape;223;p20"/>
+          <p:cNvPr id="233" name="Google Shape;233;p21"/>
           <p:cNvCxnSpPr/>
           <p:nvPr/>
         </p:nvCxnSpPr>
@@ -23788,7 +24661,7 @@
       </p:cxnSp>
       <p:graphicFrame>
         <p:nvGraphicFramePr>
-          <p:cNvPr id="224" name="Google Shape;224;p20"/>
+          <p:cNvPr id="234" name="Google Shape;234;p21"/>
           <p:cNvGraphicFramePr/>
           <p:nvPr/>
         </p:nvGraphicFramePr>
@@ -23801,7 +24674,7 @@
             <a:tbl>
               <a:tblPr bandRow="1" firstRow="1">
                 <a:noFill/>
-                <a:tableStyleId>{E1D86C35-96E0-43DC-B862-F6F609612BB4}</a:tableStyleId>
+                <a:tableStyleId>{A784A354-D9E3-495A-ADCC-CCC4445DDEA2}</a:tableStyleId>
               </a:tblPr>
               <a:tblGrid>
                 <a:gridCol w="208275"/>
@@ -24507,7 +25380,7 @@
       </p:graphicFrame>
       <p:sp>
         <p:nvSpPr>
-          <p:cNvPr id="225" name="Google Shape;225;p20"/>
+          <p:cNvPr id="235" name="Google Shape;235;p21"/>
           <p:cNvSpPr/>
           <p:nvPr/>
         </p:nvSpPr>
@@ -24582,7 +25455,7 @@
       </p:sp>
       <p:sp>
         <p:nvSpPr>
-          <p:cNvPr id="226" name="Google Shape;226;p20"/>
+          <p:cNvPr id="236" name="Google Shape;236;p21"/>
           <p:cNvSpPr txBox="1"/>
           <p:nvPr/>
         </p:nvSpPr>
@@ -24632,7 +25505,7 @@
       </p:sp>
       <p:grpSp>
         <p:nvGrpSpPr>
-          <p:cNvPr id="227" name="Google Shape;227;p20"/>
+          <p:cNvPr id="237" name="Google Shape;237;p21"/>
           <p:cNvGrpSpPr/>
           <p:nvPr/>
         </p:nvGrpSpPr>
@@ -24646,7 +25519,7 @@
         </p:grpSpPr>
         <p:sp>
           <p:nvSpPr>
-            <p:cNvPr id="228" name="Google Shape;228;p20"/>
+            <p:cNvPr id="238" name="Google Shape;238;p21"/>
             <p:cNvSpPr txBox="1"/>
             <p:nvPr/>
           </p:nvSpPr>
@@ -24700,7 +25573,7 @@
         </p:sp>
         <p:sp>
           <p:nvSpPr>
-            <p:cNvPr id="229" name="Google Shape;229;p20"/>
+            <p:cNvPr id="239" name="Google Shape;239;p21"/>
             <p:cNvSpPr txBox="1"/>
             <p:nvPr/>
           </p:nvSpPr>
@@ -24750,7 +25623,7 @@
         </p:sp>
         <p:sp>
           <p:nvSpPr>
-            <p:cNvPr id="230" name="Google Shape;230;p20"/>
+            <p:cNvPr id="240" name="Google Shape;240;p21"/>
             <p:cNvSpPr txBox="1"/>
             <p:nvPr/>
           </p:nvSpPr>
@@ -24804,7 +25677,7 @@
         </p:sp>
         <p:sp>
           <p:nvSpPr>
-            <p:cNvPr id="231" name="Google Shape;231;p20"/>
+            <p:cNvPr id="241" name="Google Shape;241;p21"/>
             <p:cNvSpPr txBox="1"/>
             <p:nvPr/>
           </p:nvSpPr>
@@ -24854,7 +25727,7 @@
         </p:sp>
         <p:sp>
           <p:nvSpPr>
-            <p:cNvPr id="232" name="Google Shape;232;p20"/>
+            <p:cNvPr id="242" name="Google Shape;242;p21"/>
             <p:cNvSpPr txBox="1"/>
             <p:nvPr/>
           </p:nvSpPr>
@@ -24908,7 +25781,7 @@
         </p:sp>
         <p:sp>
           <p:nvSpPr>
-            <p:cNvPr id="233" name="Google Shape;233;p20"/>
+            <p:cNvPr id="243" name="Google Shape;243;p21"/>
             <p:cNvSpPr txBox="1"/>
             <p:nvPr/>
           </p:nvSpPr>
@@ -24996,7 +25869,7 @@
                                           </p:stCondLst>
                                         </p:cTn>
                                         <p:tgtEl>
-                                          <p:spTgt spid="196"/>
+                                          <p:spTgt spid="206"/>
                                         </p:tgtEl>
                                         <p:attrNameLst>
                                           <p:attrName>style.visibility</p:attrName>
@@ -25041,7 +25914,7 @@
                                           </p:stCondLst>
                                         </p:cTn>
                                         <p:tgtEl>
-                                          <p:spTgt spid="202"/>
+                                          <p:spTgt spid="212"/>
                                         </p:tgtEl>
                                         <p:attrNameLst>
                                           <p:attrName>style.visibility</p:attrName>
@@ -25068,7 +25941,7 @@
                                           </p:stCondLst>
                                         </p:cTn>
                                         <p:tgtEl>
-                                          <p:spTgt spid="225"/>
+                                          <p:spTgt spid="235"/>
                                         </p:tgtEl>
                                         <p:attrNameLst>
                                           <p:attrName>style.visibility</p:attrName>
@@ -25113,7 +25986,7 @@
                                           </p:stCondLst>
                                         </p:cTn>
                                         <p:tgtEl>
-                                          <p:spTgt spid="200"/>
+                                          <p:spTgt spid="210"/>
                                         </p:tgtEl>
                                         <p:attrNameLst>
                                           <p:attrName>style.visibility</p:attrName>
@@ -25140,7 +26013,7 @@
                                           </p:stCondLst>
                                         </p:cTn>
                                         <p:tgtEl>
-                                          <p:spTgt spid="197"/>
+                                          <p:spTgt spid="207"/>
                                         </p:tgtEl>
                                         <p:attrNameLst>
                                           <p:attrName>style.visibility</p:attrName>
@@ -25173,168 +26046,6 @@
                             <p:childTnLst>
                               <p:par>
                                 <p:cTn fill="hold" nodeType="clickEffect" presetClass="entr" presetID="1" presetSubtype="0">
-                                  <p:stCondLst>
-                                    <p:cond delay="0"/>
-                                  </p:stCondLst>
-                                  <p:childTnLst>
-                                    <p:set>
-                                      <p:cBhvr>
-                                        <p:cTn dur="1" fill="hold">
-                                          <p:stCondLst>
-                                            <p:cond delay="0"/>
-                                          </p:stCondLst>
-                                        </p:cTn>
-                                        <p:tgtEl>
-                                          <p:spTgt spid="203"/>
-                                        </p:tgtEl>
-                                        <p:attrNameLst>
-                                          <p:attrName>style.visibility</p:attrName>
-                                        </p:attrNameLst>
-                                      </p:cBhvr>
-                                      <p:to>
-                                        <p:strVal val="visible"/>
-                                      </p:to>
-                                    </p:set>
-                                  </p:childTnLst>
-                                </p:cTn>
-                              </p:par>
-                              <p:par>
-                                <p:cTn fill="hold" nodeType="withEffect" presetClass="entr" presetID="1" presetSubtype="0">
-                                  <p:stCondLst>
-                                    <p:cond delay="0"/>
-                                  </p:stCondLst>
-                                  <p:childTnLst>
-                                    <p:set>
-                                      <p:cBhvr>
-                                        <p:cTn dur="1" fill="hold">
-                                          <p:stCondLst>
-                                            <p:cond delay="0"/>
-                                          </p:stCondLst>
-                                        </p:cTn>
-                                        <p:tgtEl>
-                                          <p:spTgt spid="204"/>
-                                        </p:tgtEl>
-                                        <p:attrNameLst>
-                                          <p:attrName>style.visibility</p:attrName>
-                                        </p:attrNameLst>
-                                      </p:cBhvr>
-                                      <p:to>
-                                        <p:strVal val="visible"/>
-                                      </p:to>
-                                    </p:set>
-                                  </p:childTnLst>
-                                </p:cTn>
-                              </p:par>
-                              <p:par>
-                                <p:cTn fill="hold" nodeType="withEffect" presetClass="entr" presetID="1" presetSubtype="0">
-                                  <p:stCondLst>
-                                    <p:cond delay="0"/>
-                                  </p:stCondLst>
-                                  <p:childTnLst>
-                                    <p:set>
-                                      <p:cBhvr>
-                                        <p:cTn dur="1" fill="hold">
-                                          <p:stCondLst>
-                                            <p:cond delay="0"/>
-                                          </p:stCondLst>
-                                        </p:cTn>
-                                        <p:tgtEl>
-                                          <p:spTgt spid="209"/>
-                                        </p:tgtEl>
-                                        <p:attrNameLst>
-                                          <p:attrName>style.visibility</p:attrName>
-                                        </p:attrNameLst>
-                                      </p:cBhvr>
-                                      <p:to>
-                                        <p:strVal val="visible"/>
-                                      </p:to>
-                                    </p:set>
-                                  </p:childTnLst>
-                                </p:cTn>
-                              </p:par>
-                              <p:par>
-                                <p:cTn fill="hold" nodeType="withEffect" presetClass="entr" presetID="1" presetSubtype="0">
-                                  <p:stCondLst>
-                                    <p:cond delay="0"/>
-                                  </p:stCondLst>
-                                  <p:childTnLst>
-                                    <p:set>
-                                      <p:cBhvr>
-                                        <p:cTn dur="1" fill="hold">
-                                          <p:stCondLst>
-                                            <p:cond delay="0"/>
-                                          </p:stCondLst>
-                                        </p:cTn>
-                                        <p:tgtEl>
-                                          <p:spTgt spid="210"/>
-                                        </p:tgtEl>
-                                        <p:attrNameLst>
-                                          <p:attrName>style.visibility</p:attrName>
-                                        </p:attrNameLst>
-                                      </p:cBhvr>
-                                      <p:to>
-                                        <p:strVal val="visible"/>
-                                      </p:to>
-                                    </p:set>
-                                  </p:childTnLst>
-                                </p:cTn>
-                              </p:par>
-                              <p:par>
-                                <p:cTn fill="hold" nodeType="withEffect" presetClass="entr" presetID="1" presetSubtype="0">
-                                  <p:stCondLst>
-                                    <p:cond delay="0"/>
-                                  </p:stCondLst>
-                                  <p:childTnLst>
-                                    <p:set>
-                                      <p:cBhvr>
-                                        <p:cTn dur="1" fill="hold">
-                                          <p:stCondLst>
-                                            <p:cond delay="0"/>
-                                          </p:stCondLst>
-                                        </p:cTn>
-                                        <p:tgtEl>
-                                          <p:spTgt spid="211"/>
-                                        </p:tgtEl>
-                                        <p:attrNameLst>
-                                          <p:attrName>style.visibility</p:attrName>
-                                        </p:attrNameLst>
-                                      </p:cBhvr>
-                                      <p:to>
-                                        <p:strVal val="visible"/>
-                                      </p:to>
-                                    </p:set>
-                                  </p:childTnLst>
-                                </p:cTn>
-                              </p:par>
-                              <p:par>
-                                <p:cTn fill="hold" nodeType="withEffect" presetClass="entr" presetID="1" presetSubtype="0">
-                                  <p:stCondLst>
-                                    <p:cond delay="0"/>
-                                  </p:stCondLst>
-                                  <p:childTnLst>
-                                    <p:set>
-                                      <p:cBhvr>
-                                        <p:cTn dur="1" fill="hold">
-                                          <p:stCondLst>
-                                            <p:cond delay="0"/>
-                                          </p:stCondLst>
-                                        </p:cTn>
-                                        <p:tgtEl>
-                                          <p:spTgt spid="212"/>
-                                        </p:tgtEl>
-                                        <p:attrNameLst>
-                                          <p:attrName>style.visibility</p:attrName>
-                                        </p:attrNameLst>
-                                      </p:cBhvr>
-                                      <p:to>
-                                        <p:strVal val="visible"/>
-                                      </p:to>
-                                    </p:set>
-                                  </p:childTnLst>
-                                </p:cTn>
-                              </p:par>
-                              <p:par>
-                                <p:cTn fill="hold" nodeType="withEffect" presetClass="entr" presetID="1" presetSubtype="0">
                                   <p:stCondLst>
                                     <p:cond delay="0"/>
                                   </p:stCondLst>
@@ -25401,286 +26112,7 @@
                                           </p:stCondLst>
                                         </p:cTn>
                                         <p:tgtEl>
-                                          <p:spTgt spid="215"/>
-                                        </p:tgtEl>
-                                        <p:attrNameLst>
-                                          <p:attrName>style.visibility</p:attrName>
-                                        </p:attrNameLst>
-                                      </p:cBhvr>
-                                      <p:to>
-                                        <p:strVal val="visible"/>
-                                      </p:to>
-                                    </p:set>
-                                  </p:childTnLst>
-                                </p:cTn>
-                              </p:par>
-                              <p:par>
-                                <p:cTn fill="hold" nodeType="withEffect" presetClass="entr" presetID="1" presetSubtype="0">
-                                  <p:stCondLst>
-                                    <p:cond delay="0"/>
-                                  </p:stCondLst>
-                                  <p:childTnLst>
-                                    <p:set>
-                                      <p:cBhvr>
-                                        <p:cTn dur="1" fill="hold">
-                                          <p:stCondLst>
-                                            <p:cond delay="0"/>
-                                          </p:stCondLst>
-                                        </p:cTn>
-                                        <p:tgtEl>
-                                          <p:spTgt spid="216"/>
-                                        </p:tgtEl>
-                                        <p:attrNameLst>
-                                          <p:attrName>style.visibility</p:attrName>
-                                        </p:attrNameLst>
-                                      </p:cBhvr>
-                                      <p:to>
-                                        <p:strVal val="visible"/>
-                                      </p:to>
-                                    </p:set>
-                                  </p:childTnLst>
-                                </p:cTn>
-                              </p:par>
-                              <p:par>
-                                <p:cTn fill="hold" nodeType="withEffect" presetClass="entr" presetID="1" presetSubtype="0">
-                                  <p:stCondLst>
-                                    <p:cond delay="0"/>
-                                  </p:stCondLst>
-                                  <p:childTnLst>
-                                    <p:set>
-                                      <p:cBhvr>
-                                        <p:cTn dur="1" fill="hold">
-                                          <p:stCondLst>
-                                            <p:cond delay="0"/>
-                                          </p:stCondLst>
-                                        </p:cTn>
-                                        <p:tgtEl>
-                                          <p:spTgt spid="217"/>
-                                        </p:tgtEl>
-                                        <p:attrNameLst>
-                                          <p:attrName>style.visibility</p:attrName>
-                                        </p:attrNameLst>
-                                      </p:cBhvr>
-                                      <p:to>
-                                        <p:strVal val="visible"/>
-                                      </p:to>
-                                    </p:set>
-                                  </p:childTnLst>
-                                </p:cTn>
-                              </p:par>
-                              <p:par>
-                                <p:cTn fill="hold" nodeType="withEffect" presetClass="entr" presetID="1" presetSubtype="0">
-                                  <p:stCondLst>
-                                    <p:cond delay="0"/>
-                                  </p:stCondLst>
-                                  <p:childTnLst>
-                                    <p:set>
-                                      <p:cBhvr>
-                                        <p:cTn dur="1" fill="hold">
-                                          <p:stCondLst>
-                                            <p:cond delay="0"/>
-                                          </p:stCondLst>
-                                        </p:cTn>
-                                        <p:tgtEl>
-                                          <p:spTgt spid="218"/>
-                                        </p:tgtEl>
-                                        <p:attrNameLst>
-                                          <p:attrName>style.visibility</p:attrName>
-                                        </p:attrNameLst>
-                                      </p:cBhvr>
-                                      <p:to>
-                                        <p:strVal val="visible"/>
-                                      </p:to>
-                                    </p:set>
-                                  </p:childTnLst>
-                                </p:cTn>
-                              </p:par>
-                            </p:childTnLst>
-                          </p:cTn>
-                        </p:par>
-                      </p:childTnLst>
-                    </p:cTn>
-                  </p:par>
-                  <p:par>
-                    <p:cTn fill="hold">
-                      <p:stCondLst>
-                        <p:cond delay="indefinite"/>
-                      </p:stCondLst>
-                      <p:childTnLst>
-                        <p:par>
-                          <p:cTn fill="hold">
-                            <p:stCondLst>
-                              <p:cond delay="0"/>
-                            </p:stCondLst>
-                            <p:childTnLst>
-                              <p:par>
-                                <p:cTn fill="hold" nodeType="clickEffect" presetClass="entr" presetID="1" presetSubtype="0">
-                                  <p:stCondLst>
-                                    <p:cond delay="0"/>
-                                  </p:stCondLst>
-                                  <p:childTnLst>
-                                    <p:set>
-                                      <p:cBhvr>
-                                        <p:cTn dur="1" fill="hold">
-                                          <p:stCondLst>
-                                            <p:cond delay="0"/>
-                                          </p:stCondLst>
-                                        </p:cTn>
-                                        <p:tgtEl>
-                                          <p:spTgt spid="208"/>
-                                        </p:tgtEl>
-                                        <p:attrNameLst>
-                                          <p:attrName>style.visibility</p:attrName>
-                                        </p:attrNameLst>
-                                      </p:cBhvr>
-                                      <p:to>
-                                        <p:strVal val="visible"/>
-                                      </p:to>
-                                    </p:set>
-                                  </p:childTnLst>
-                                </p:cTn>
-                              </p:par>
-                              <p:par>
-                                <p:cTn fill="hold" nodeType="withEffect" presetClass="entr" presetID="1" presetSubtype="0">
-                                  <p:stCondLst>
-                                    <p:cond delay="0"/>
-                                  </p:stCondLst>
-                                  <p:childTnLst>
-                                    <p:set>
-                                      <p:cBhvr>
-                                        <p:cTn dur="1" fill="hold">
-                                          <p:stCondLst>
-                                            <p:cond delay="0"/>
-                                          </p:stCondLst>
-                                        </p:cTn>
-                                        <p:tgtEl>
-                                          <p:spTgt spid="198"/>
-                                        </p:tgtEl>
-                                        <p:attrNameLst>
-                                          <p:attrName>style.visibility</p:attrName>
-                                        </p:attrNameLst>
-                                      </p:cBhvr>
-                                      <p:to>
-                                        <p:strVal val="visible"/>
-                                      </p:to>
-                                    </p:set>
-                                  </p:childTnLst>
-                                </p:cTn>
-                              </p:par>
-                            </p:childTnLst>
-                          </p:cTn>
-                        </p:par>
-                      </p:childTnLst>
-                    </p:cTn>
-                  </p:par>
-                  <p:par>
-                    <p:cTn fill="hold">
-                      <p:stCondLst>
-                        <p:cond delay="indefinite"/>
-                      </p:stCondLst>
-                      <p:childTnLst>
-                        <p:par>
-                          <p:cTn fill="hold">
-                            <p:stCondLst>
-                              <p:cond delay="0"/>
-                            </p:stCondLst>
-                            <p:childTnLst>
-                              <p:par>
-                                <p:cTn fill="hold" nodeType="clickEffect" presetClass="entr" presetID="1" presetSubtype="0">
-                                  <p:stCondLst>
-                                    <p:cond delay="0"/>
-                                  </p:stCondLst>
-                                  <p:childTnLst>
-                                    <p:set>
-                                      <p:cBhvr>
-                                        <p:cTn dur="1" fill="hold">
-                                          <p:stCondLst>
-                                            <p:cond delay="0"/>
-                                          </p:stCondLst>
-                                        </p:cTn>
-                                        <p:tgtEl>
-                                          <p:spTgt spid="205"/>
-                                        </p:tgtEl>
-                                        <p:attrNameLst>
-                                          <p:attrName>style.visibility</p:attrName>
-                                        </p:attrNameLst>
-                                      </p:cBhvr>
-                                      <p:to>
-                                        <p:strVal val="visible"/>
-                                      </p:to>
-                                    </p:set>
-                                  </p:childTnLst>
-                                </p:cTn>
-                              </p:par>
-                              <p:par>
-                                <p:cTn fill="hold" nodeType="withEffect" presetClass="entr" presetID="1" presetSubtype="0">
-                                  <p:stCondLst>
-                                    <p:cond delay="0"/>
-                                  </p:stCondLst>
-                                  <p:childTnLst>
-                                    <p:set>
-                                      <p:cBhvr>
-                                        <p:cTn dur="1" fill="hold">
-                                          <p:stCondLst>
-                                            <p:cond delay="0"/>
-                                          </p:stCondLst>
-                                        </p:cTn>
-                                        <p:tgtEl>
-                                          <p:spTgt spid="206"/>
-                                        </p:tgtEl>
-                                        <p:attrNameLst>
-                                          <p:attrName>style.visibility</p:attrName>
-                                        </p:attrNameLst>
-                                      </p:cBhvr>
-                                      <p:to>
-                                        <p:strVal val="visible"/>
-                                      </p:to>
-                                    </p:set>
-                                  </p:childTnLst>
-                                </p:cTn>
-                              </p:par>
-                              <p:par>
-                                <p:cTn fill="hold" nodeType="withEffect" presetClass="entr" presetID="1" presetSubtype="0">
-                                  <p:stCondLst>
-                                    <p:cond delay="0"/>
-                                  </p:stCondLst>
-                                  <p:childTnLst>
-                                    <p:set>
-                                      <p:cBhvr>
-                                        <p:cTn dur="1" fill="hold">
-                                          <p:stCondLst>
-                                            <p:cond delay="0"/>
-                                          </p:stCondLst>
-                                        </p:cTn>
-                                        <p:tgtEl>
                                           <p:spTgt spid="219"/>
-                                        </p:tgtEl>
-                                        <p:attrNameLst>
-                                          <p:attrName>style.visibility</p:attrName>
-                                        </p:attrNameLst>
-                                      </p:cBhvr>
-                                      <p:to>
-                                        <p:strVal val="visible"/>
-                                      </p:to>
-                                    </p:set>
-                                  </p:childTnLst>
-                                </p:cTn>
-                              </p:par>
-                              <p:par>
-                                <p:cTn fill="hold" nodeType="withEffect" presetClass="entr" presetID="1" presetSubtype="0">
-                                  <p:stCondLst>
-                                    <p:cond delay="0"/>
-                                  </p:stCondLst>
-                                  <p:childTnLst>
-                                    <p:set>
-                                      <p:cBhvr>
-                                        <p:cTn dur="1" fill="hold">
-                                          <p:stCondLst>
-                                            <p:cond delay="0"/>
-                                          </p:stCondLst>
-                                        </p:cTn>
-                                        <p:tgtEl>
-                                          <p:spTgt spid="227"/>
                                         </p:tgtEl>
                                         <p:attrNameLst>
                                           <p:attrName>style.visibility</p:attrName>
@@ -25774,26 +26206,8 @@
                                   </p:childTnLst>
                                 </p:cTn>
                               </p:par>
-                            </p:childTnLst>
-                          </p:cTn>
-                        </p:par>
-                      </p:childTnLst>
-                    </p:cTn>
-                  </p:par>
-                  <p:par>
-                    <p:cTn fill="hold">
-                      <p:stCondLst>
-                        <p:cond delay="indefinite"/>
-                      </p:stCondLst>
-                      <p:childTnLst>
-                        <p:par>
-                          <p:cTn fill="hold">
-                            <p:stCondLst>
-                              <p:cond delay="0"/>
-                            </p:stCondLst>
-                            <p:childTnLst>
                               <p:par>
-                                <p:cTn fill="hold" nodeType="clickEffect" presetClass="entr" presetID="1" presetSubtype="0">
+                                <p:cTn fill="hold" nodeType="withEffect" presetClass="entr" presetID="1" presetSubtype="0">
                                   <p:stCondLst>
                                     <p:cond delay="0"/>
                                   </p:stCondLst>
@@ -25806,7 +26220,7 @@
                                           </p:stCondLst>
                                         </p:cTn>
                                         <p:tgtEl>
-                                          <p:spTgt spid="201"/>
+                                          <p:spTgt spid="223"/>
                                         </p:tgtEl>
                                         <p:attrNameLst>
                                           <p:attrName>style.visibility</p:attrName>
@@ -25833,7 +26247,115 @@
                                           </p:stCondLst>
                                         </p:cTn>
                                         <p:tgtEl>
-                                          <p:spTgt spid="199"/>
+                                          <p:spTgt spid="224"/>
+                                        </p:tgtEl>
+                                        <p:attrNameLst>
+                                          <p:attrName>style.visibility</p:attrName>
+                                        </p:attrNameLst>
+                                      </p:cBhvr>
+                                      <p:to>
+                                        <p:strVal val="visible"/>
+                                      </p:to>
+                                    </p:set>
+                                  </p:childTnLst>
+                                </p:cTn>
+                              </p:par>
+                              <p:par>
+                                <p:cTn fill="hold" nodeType="withEffect" presetClass="entr" presetID="1" presetSubtype="0">
+                                  <p:stCondLst>
+                                    <p:cond delay="0"/>
+                                  </p:stCondLst>
+                                  <p:childTnLst>
+                                    <p:set>
+                                      <p:cBhvr>
+                                        <p:cTn dur="1" fill="hold">
+                                          <p:stCondLst>
+                                            <p:cond delay="0"/>
+                                          </p:stCondLst>
+                                        </p:cTn>
+                                        <p:tgtEl>
+                                          <p:spTgt spid="225"/>
+                                        </p:tgtEl>
+                                        <p:attrNameLst>
+                                          <p:attrName>style.visibility</p:attrName>
+                                        </p:attrNameLst>
+                                      </p:cBhvr>
+                                      <p:to>
+                                        <p:strVal val="visible"/>
+                                      </p:to>
+                                    </p:set>
+                                  </p:childTnLst>
+                                </p:cTn>
+                              </p:par>
+                              <p:par>
+                                <p:cTn fill="hold" nodeType="withEffect" presetClass="entr" presetID="1" presetSubtype="0">
+                                  <p:stCondLst>
+                                    <p:cond delay="0"/>
+                                  </p:stCondLst>
+                                  <p:childTnLst>
+                                    <p:set>
+                                      <p:cBhvr>
+                                        <p:cTn dur="1" fill="hold">
+                                          <p:stCondLst>
+                                            <p:cond delay="0"/>
+                                          </p:stCondLst>
+                                        </p:cTn>
+                                        <p:tgtEl>
+                                          <p:spTgt spid="226"/>
+                                        </p:tgtEl>
+                                        <p:attrNameLst>
+                                          <p:attrName>style.visibility</p:attrName>
+                                        </p:attrNameLst>
+                                      </p:cBhvr>
+                                      <p:to>
+                                        <p:strVal val="visible"/>
+                                      </p:to>
+                                    </p:set>
+                                  </p:childTnLst>
+                                </p:cTn>
+                              </p:par>
+                              <p:par>
+                                <p:cTn fill="hold" nodeType="withEffect" presetClass="entr" presetID="1" presetSubtype="0">
+                                  <p:stCondLst>
+                                    <p:cond delay="0"/>
+                                  </p:stCondLst>
+                                  <p:childTnLst>
+                                    <p:set>
+                                      <p:cBhvr>
+                                        <p:cTn dur="1" fill="hold">
+                                          <p:stCondLst>
+                                            <p:cond delay="0"/>
+                                          </p:stCondLst>
+                                        </p:cTn>
+                                        <p:tgtEl>
+                                          <p:spTgt spid="227"/>
+                                        </p:tgtEl>
+                                        <p:attrNameLst>
+                                          <p:attrName>style.visibility</p:attrName>
+                                        </p:attrNameLst>
+                                      </p:cBhvr>
+                                      <p:to>
+                                        <p:strVal val="visible"/>
+                                      </p:to>
+                                    </p:set>
+                                  </p:childTnLst>
+                                </p:cTn>
+                              </p:par>
+                              <p:par>
+                                <p:cTn fill="hold" nodeType="withEffect" presetClass="entr" presetID="1" presetSubtype="0">
+                                  <p:stCondLst>
+                                    <p:cond delay="0"/>
+                                  </p:stCondLst>
+                                  <p:childTnLst>
+                                    <p:set>
+                                      <p:cBhvr>
+                                        <p:cTn dur="1" fill="hold">
+                                          <p:stCondLst>
+                                            <p:cond delay="0"/>
+                                          </p:stCondLst>
+                                        </p:cTn>
+                                        <p:tgtEl>
+                                          <p:spTgt spid="228"/>
                                         </p:tgtEl>
                                         <p:attrNameLst>
                                           <p:attrName>style.visibility</p:attrName>
@@ -25878,7 +26400,358 @@
                                           </p:stCondLst>
                                         </p:cTn>
                                         <p:tgtEl>
-                                          <p:spTgt spid="207"/>
+                                          <p:spTgt spid="218"/>
+                                        </p:tgtEl>
+                                        <p:attrNameLst>
+                                          <p:attrName>style.visibility</p:attrName>
+                                        </p:attrNameLst>
+                                      </p:cBhvr>
+                                      <p:to>
+                                        <p:strVal val="visible"/>
+                                      </p:to>
+                                    </p:set>
+                                  </p:childTnLst>
+                                </p:cTn>
+                              </p:par>
+                              <p:par>
+                                <p:cTn fill="hold" nodeType="withEffect" presetClass="entr" presetID="1" presetSubtype="0">
+                                  <p:stCondLst>
+                                    <p:cond delay="0"/>
+                                  </p:stCondLst>
+                                  <p:childTnLst>
+                                    <p:set>
+                                      <p:cBhvr>
+                                        <p:cTn dur="1" fill="hold">
+                                          <p:stCondLst>
+                                            <p:cond delay="0"/>
+                                          </p:stCondLst>
+                                        </p:cTn>
+                                        <p:tgtEl>
+                                          <p:spTgt spid="208"/>
+                                        </p:tgtEl>
+                                        <p:attrNameLst>
+                                          <p:attrName>style.visibility</p:attrName>
+                                        </p:attrNameLst>
+                                      </p:cBhvr>
+                                      <p:to>
+                                        <p:strVal val="visible"/>
+                                      </p:to>
+                                    </p:set>
+                                  </p:childTnLst>
+                                </p:cTn>
+                              </p:par>
+                            </p:childTnLst>
+                          </p:cTn>
+                        </p:par>
+                      </p:childTnLst>
+                    </p:cTn>
+                  </p:par>
+                  <p:par>
+                    <p:cTn fill="hold">
+                      <p:stCondLst>
+                        <p:cond delay="indefinite"/>
+                      </p:stCondLst>
+                      <p:childTnLst>
+                        <p:par>
+                          <p:cTn fill="hold">
+                            <p:stCondLst>
+                              <p:cond delay="0"/>
+                            </p:stCondLst>
+                            <p:childTnLst>
+                              <p:par>
+                                <p:cTn fill="hold" nodeType="clickEffect" presetClass="entr" presetID="1" presetSubtype="0">
+                                  <p:stCondLst>
+                                    <p:cond delay="0"/>
+                                  </p:stCondLst>
+                                  <p:childTnLst>
+                                    <p:set>
+                                      <p:cBhvr>
+                                        <p:cTn dur="1" fill="hold">
+                                          <p:stCondLst>
+                                            <p:cond delay="0"/>
+                                          </p:stCondLst>
+                                        </p:cTn>
+                                        <p:tgtEl>
+                                          <p:spTgt spid="215"/>
+                                        </p:tgtEl>
+                                        <p:attrNameLst>
+                                          <p:attrName>style.visibility</p:attrName>
+                                        </p:attrNameLst>
+                                      </p:cBhvr>
+                                      <p:to>
+                                        <p:strVal val="visible"/>
+                                      </p:to>
+                                    </p:set>
+                                  </p:childTnLst>
+                                </p:cTn>
+                              </p:par>
+                              <p:par>
+                                <p:cTn fill="hold" nodeType="withEffect" presetClass="entr" presetID="1" presetSubtype="0">
+                                  <p:stCondLst>
+                                    <p:cond delay="0"/>
+                                  </p:stCondLst>
+                                  <p:childTnLst>
+                                    <p:set>
+                                      <p:cBhvr>
+                                        <p:cTn dur="1" fill="hold">
+                                          <p:stCondLst>
+                                            <p:cond delay="0"/>
+                                          </p:stCondLst>
+                                        </p:cTn>
+                                        <p:tgtEl>
+                                          <p:spTgt spid="216"/>
+                                        </p:tgtEl>
+                                        <p:attrNameLst>
+                                          <p:attrName>style.visibility</p:attrName>
+                                        </p:attrNameLst>
+                                      </p:cBhvr>
+                                      <p:to>
+                                        <p:strVal val="visible"/>
+                                      </p:to>
+                                    </p:set>
+                                  </p:childTnLst>
+                                </p:cTn>
+                              </p:par>
+                              <p:par>
+                                <p:cTn fill="hold" nodeType="withEffect" presetClass="entr" presetID="1" presetSubtype="0">
+                                  <p:stCondLst>
+                                    <p:cond delay="0"/>
+                                  </p:stCondLst>
+                                  <p:childTnLst>
+                                    <p:set>
+                                      <p:cBhvr>
+                                        <p:cTn dur="1" fill="hold">
+                                          <p:stCondLst>
+                                            <p:cond delay="0"/>
+                                          </p:stCondLst>
+                                        </p:cTn>
+                                        <p:tgtEl>
+                                          <p:spTgt spid="229"/>
+                                        </p:tgtEl>
+                                        <p:attrNameLst>
+                                          <p:attrName>style.visibility</p:attrName>
+                                        </p:attrNameLst>
+                                      </p:cBhvr>
+                                      <p:to>
+                                        <p:strVal val="visible"/>
+                                      </p:to>
+                                    </p:set>
+                                  </p:childTnLst>
+                                </p:cTn>
+                              </p:par>
+                              <p:par>
+                                <p:cTn fill="hold" nodeType="withEffect" presetClass="entr" presetID="1" presetSubtype="0">
+                                  <p:stCondLst>
+                                    <p:cond delay="0"/>
+                                  </p:stCondLst>
+                                  <p:childTnLst>
+                                    <p:set>
+                                      <p:cBhvr>
+                                        <p:cTn dur="1" fill="hold">
+                                          <p:stCondLst>
+                                            <p:cond delay="0"/>
+                                          </p:stCondLst>
+                                        </p:cTn>
+                                        <p:tgtEl>
+                                          <p:spTgt spid="237"/>
+                                        </p:tgtEl>
+                                        <p:attrNameLst>
+                                          <p:attrName>style.visibility</p:attrName>
+                                        </p:attrNameLst>
+                                      </p:cBhvr>
+                                      <p:to>
+                                        <p:strVal val="visible"/>
+                                      </p:to>
+                                    </p:set>
+                                  </p:childTnLst>
+                                </p:cTn>
+                              </p:par>
+                              <p:par>
+                                <p:cTn fill="hold" nodeType="withEffect" presetClass="entr" presetID="1" presetSubtype="0">
+                                  <p:stCondLst>
+                                    <p:cond delay="0"/>
+                                  </p:stCondLst>
+                                  <p:childTnLst>
+                                    <p:set>
+                                      <p:cBhvr>
+                                        <p:cTn dur="1" fill="hold">
+                                          <p:stCondLst>
+                                            <p:cond delay="0"/>
+                                          </p:stCondLst>
+                                        </p:cTn>
+                                        <p:tgtEl>
+                                          <p:spTgt spid="230"/>
+                                        </p:tgtEl>
+                                        <p:attrNameLst>
+                                          <p:attrName>style.visibility</p:attrName>
+                                        </p:attrNameLst>
+                                      </p:cBhvr>
+                                      <p:to>
+                                        <p:strVal val="visible"/>
+                                      </p:to>
+                                    </p:set>
+                                  </p:childTnLst>
+                                </p:cTn>
+                              </p:par>
+                              <p:par>
+                                <p:cTn fill="hold" nodeType="withEffect" presetClass="entr" presetID="1" presetSubtype="0">
+                                  <p:stCondLst>
+                                    <p:cond delay="0"/>
+                                  </p:stCondLst>
+                                  <p:childTnLst>
+                                    <p:set>
+                                      <p:cBhvr>
+                                        <p:cTn dur="1" fill="hold">
+                                          <p:stCondLst>
+                                            <p:cond delay="0"/>
+                                          </p:stCondLst>
+                                        </p:cTn>
+                                        <p:tgtEl>
+                                          <p:spTgt spid="231"/>
+                                        </p:tgtEl>
+                                        <p:attrNameLst>
+                                          <p:attrName>style.visibility</p:attrName>
+                                        </p:attrNameLst>
+                                      </p:cBhvr>
+                                      <p:to>
+                                        <p:strVal val="visible"/>
+                                      </p:to>
+                                    </p:set>
+                                  </p:childTnLst>
+                                </p:cTn>
+                              </p:par>
+                              <p:par>
+                                <p:cTn fill="hold" nodeType="withEffect" presetClass="entr" presetID="1" presetSubtype="0">
+                                  <p:stCondLst>
+                                    <p:cond delay="0"/>
+                                  </p:stCondLst>
+                                  <p:childTnLst>
+                                    <p:set>
+                                      <p:cBhvr>
+                                        <p:cTn dur="1" fill="hold">
+                                          <p:stCondLst>
+                                            <p:cond delay="0"/>
+                                          </p:stCondLst>
+                                        </p:cTn>
+                                        <p:tgtEl>
+                                          <p:spTgt spid="232"/>
+                                        </p:tgtEl>
+                                        <p:attrNameLst>
+                                          <p:attrName>style.visibility</p:attrName>
+                                        </p:attrNameLst>
+                                      </p:cBhvr>
+                                      <p:to>
+                                        <p:strVal val="visible"/>
+                                      </p:to>
+                                    </p:set>
+                                  </p:childTnLst>
+                                </p:cTn>
+                              </p:par>
+                            </p:childTnLst>
+                          </p:cTn>
+                        </p:par>
+                      </p:childTnLst>
+                    </p:cTn>
+                  </p:par>
+                  <p:par>
+                    <p:cTn fill="hold">
+                      <p:stCondLst>
+                        <p:cond delay="indefinite"/>
+                      </p:stCondLst>
+                      <p:childTnLst>
+                        <p:par>
+                          <p:cTn fill="hold">
+                            <p:stCondLst>
+                              <p:cond delay="0"/>
+                            </p:stCondLst>
+                            <p:childTnLst>
+                              <p:par>
+                                <p:cTn fill="hold" nodeType="clickEffect" presetClass="entr" presetID="1" presetSubtype="0">
+                                  <p:stCondLst>
+                                    <p:cond delay="0"/>
+                                  </p:stCondLst>
+                                  <p:childTnLst>
+                                    <p:set>
+                                      <p:cBhvr>
+                                        <p:cTn dur="1" fill="hold">
+                                          <p:stCondLst>
+                                            <p:cond delay="0"/>
+                                          </p:stCondLst>
+                                        </p:cTn>
+                                        <p:tgtEl>
+                                          <p:spTgt spid="211"/>
+                                        </p:tgtEl>
+                                        <p:attrNameLst>
+                                          <p:attrName>style.visibility</p:attrName>
+                                        </p:attrNameLst>
+                                      </p:cBhvr>
+                                      <p:to>
+                                        <p:strVal val="visible"/>
+                                      </p:to>
+                                    </p:set>
+                                  </p:childTnLst>
+                                </p:cTn>
+                              </p:par>
+                              <p:par>
+                                <p:cTn fill="hold" nodeType="withEffect" presetClass="entr" presetID="1" presetSubtype="0">
+                                  <p:stCondLst>
+                                    <p:cond delay="0"/>
+                                  </p:stCondLst>
+                                  <p:childTnLst>
+                                    <p:set>
+                                      <p:cBhvr>
+                                        <p:cTn dur="1" fill="hold">
+                                          <p:stCondLst>
+                                            <p:cond delay="0"/>
+                                          </p:stCondLst>
+                                        </p:cTn>
+                                        <p:tgtEl>
+                                          <p:spTgt spid="209"/>
+                                        </p:tgtEl>
+                                        <p:attrNameLst>
+                                          <p:attrName>style.visibility</p:attrName>
+                                        </p:attrNameLst>
+                                      </p:cBhvr>
+                                      <p:to>
+                                        <p:strVal val="visible"/>
+                                      </p:to>
+                                    </p:set>
+                                  </p:childTnLst>
+                                </p:cTn>
+                              </p:par>
+                            </p:childTnLst>
+                          </p:cTn>
+                        </p:par>
+                      </p:childTnLst>
+                    </p:cTn>
+                  </p:par>
+                  <p:par>
+                    <p:cTn fill="hold">
+                      <p:stCondLst>
+                        <p:cond delay="indefinite"/>
+                      </p:stCondLst>
+                      <p:childTnLst>
+                        <p:par>
+                          <p:cTn fill="hold">
+                            <p:stCondLst>
+                              <p:cond delay="0"/>
+                            </p:stCondLst>
+                            <p:childTnLst>
+                              <p:par>
+                                <p:cTn fill="hold" nodeType="clickEffect" presetClass="entr" presetID="1" presetSubtype="0">
+                                  <p:stCondLst>
+                                    <p:cond delay="0"/>
+                                  </p:stCondLst>
+                                  <p:childTnLst>
+                                    <p:set>
+                                      <p:cBhvr>
+                                        <p:cTn dur="1" fill="hold">
+                                          <p:stCondLst>
+                                            <p:cond delay="0"/>
+                                          </p:stCondLst>
+                                        </p:cTn>
+                                        <p:tgtEl>
+                                          <p:spTgt spid="217"/>
                                         </p:tgtEl>
                                         <p:attrNameLst>
                                           <p:attrName>style.visibility</p:attrName>
@@ -25927,7 +26800,7 @@
   <p:cSld>
     <p:spTree>
       <p:nvGrpSpPr>
-        <p:cNvPr id="237" name="Shape 237"/>
+        <p:cNvPr id="247" name="Shape 247"/>
         <p:cNvGrpSpPr/>
         <p:nvPr/>
       </p:nvGrpSpPr>
@@ -25941,7 +26814,7 @@
       </p:grpSpPr>
       <p:sp>
         <p:nvSpPr>
-          <p:cNvPr id="238" name="Google Shape;238;p21"/>
+          <p:cNvPr id="248" name="Google Shape;248;p22"/>
           <p:cNvSpPr txBox="1"/>
           <p:nvPr>
             <p:ph type="title"/>
@@ -25996,7 +26869,7 @@
       </p:sp>
       <p:sp>
         <p:nvSpPr>
-          <p:cNvPr id="239" name="Google Shape;239;p21"/>
+          <p:cNvPr id="249" name="Google Shape;249;p22"/>
           <p:cNvSpPr txBox="1"/>
           <p:nvPr>
             <p:ph idx="12" type="sldNum"/>
@@ -26040,7 +26913,7 @@
       </p:sp>
       <p:pic>
         <p:nvPicPr>
-          <p:cNvPr id="240" name="Google Shape;240;p21"/>
+          <p:cNvPr id="250" name="Google Shape;250;p22"/>
           <p:cNvPicPr preferRelativeResize="0"/>
           <p:nvPr/>
         </p:nvPicPr>
@@ -26067,7 +26940,7 @@
       </p:pic>
       <p:pic>
         <p:nvPicPr>
-          <p:cNvPr id="241" name="Google Shape;241;p21"/>
+          <p:cNvPr id="251" name="Google Shape;251;p22"/>
           <p:cNvPicPr preferRelativeResize="0"/>
           <p:nvPr/>
         </p:nvPicPr>
@@ -26094,7 +26967,7 @@
       </p:pic>
       <p:grpSp>
         <p:nvGrpSpPr>
-          <p:cNvPr id="242" name="Google Shape;242;p21"/>
+          <p:cNvPr id="252" name="Google Shape;252;p22"/>
           <p:cNvGrpSpPr/>
           <p:nvPr/>
         </p:nvGrpSpPr>
@@ -26108,7 +26981,7 @@
         </p:grpSpPr>
         <p:sp>
           <p:nvSpPr>
-            <p:cNvPr id="243" name="Google Shape;243;p21"/>
+            <p:cNvPr id="253" name="Google Shape;253;p22"/>
             <p:cNvSpPr/>
             <p:nvPr/>
           </p:nvSpPr>
@@ -26174,7 +27047,7 @@
         </p:sp>
         <p:sp>
           <p:nvSpPr>
-            <p:cNvPr id="244" name="Google Shape;244;p21"/>
+            <p:cNvPr id="254" name="Google Shape;254;p22"/>
             <p:cNvSpPr/>
             <p:nvPr/>
           </p:nvSpPr>
@@ -26240,7 +27113,7 @@
         </p:sp>
         <p:sp>
           <p:nvSpPr>
-            <p:cNvPr id="245" name="Google Shape;245;p21"/>
+            <p:cNvPr id="255" name="Google Shape;255;p22"/>
             <p:cNvSpPr/>
             <p:nvPr/>
           </p:nvSpPr>
@@ -26307,7 +27180,7 @@
       </p:grpSp>
       <p:grpSp>
         <p:nvGrpSpPr>
-          <p:cNvPr id="246" name="Google Shape;246;p21"/>
+          <p:cNvPr id="256" name="Google Shape;256;p22"/>
           <p:cNvGrpSpPr/>
           <p:nvPr/>
         </p:nvGrpSpPr>
@@ -26321,7 +27194,7 @@
         </p:grpSpPr>
         <p:sp>
           <p:nvSpPr>
-            <p:cNvPr id="247" name="Google Shape;247;p21"/>
+            <p:cNvPr id="257" name="Google Shape;257;p22"/>
             <p:cNvSpPr/>
             <p:nvPr/>
           </p:nvSpPr>
@@ -26387,7 +27260,7 @@
         </p:sp>
         <p:sp>
           <p:nvSpPr>
-            <p:cNvPr id="248" name="Google Shape;248;p21"/>
+            <p:cNvPr id="258" name="Google Shape;258;p22"/>
             <p:cNvSpPr/>
             <p:nvPr/>
           </p:nvSpPr>
@@ -26453,7 +27326,7 @@
         </p:sp>
         <p:sp>
           <p:nvSpPr>
-            <p:cNvPr id="249" name="Google Shape;249;p21"/>
+            <p:cNvPr id="259" name="Google Shape;259;p22"/>
             <p:cNvSpPr/>
             <p:nvPr/>
           </p:nvSpPr>
@@ -26519,7 +27392,7 @@
         </p:sp>
         <p:sp>
           <p:nvSpPr>
-            <p:cNvPr id="250" name="Google Shape;250;p21"/>
+            <p:cNvPr id="260" name="Google Shape;260;p22"/>
             <p:cNvSpPr/>
             <p:nvPr/>
           </p:nvSpPr>
@@ -26585,7 +27458,7 @@
         </p:sp>
         <p:sp>
           <p:nvSpPr>
-            <p:cNvPr id="251" name="Google Shape;251;p21"/>
+            <p:cNvPr id="261" name="Google Shape;261;p22"/>
             <p:cNvSpPr/>
             <p:nvPr/>
           </p:nvSpPr>
@@ -26651,7 +27524,7 @@
         </p:sp>
         <p:sp>
           <p:nvSpPr>
-            <p:cNvPr id="252" name="Google Shape;252;p21"/>
+            <p:cNvPr id="262" name="Google Shape;262;p22"/>
             <p:cNvSpPr/>
             <p:nvPr/>
           </p:nvSpPr>
@@ -26717,7 +27590,7 @@
         </p:sp>
         <p:sp>
           <p:nvSpPr>
-            <p:cNvPr id="253" name="Google Shape;253;p21"/>
+            <p:cNvPr id="263" name="Google Shape;263;p22"/>
             <p:cNvSpPr/>
             <p:nvPr/>
           </p:nvSpPr>
@@ -26783,7 +27656,7 @@
         </p:sp>
         <p:sp>
           <p:nvSpPr>
-            <p:cNvPr id="254" name="Google Shape;254;p21"/>
+            <p:cNvPr id="264" name="Google Shape;264;p22"/>
             <p:cNvSpPr/>
             <p:nvPr/>
           </p:nvSpPr>
@@ -26849,7 +27722,7 @@
         </p:sp>
         <p:sp>
           <p:nvSpPr>
-            <p:cNvPr id="255" name="Google Shape;255;p21"/>
+            <p:cNvPr id="265" name="Google Shape;265;p22"/>
             <p:cNvSpPr/>
             <p:nvPr/>
           </p:nvSpPr>
@@ -26916,7 +27789,7 @@
       </p:grpSp>
       <p:sp>
         <p:nvSpPr>
-          <p:cNvPr id="256" name="Google Shape;256;p21"/>
+          <p:cNvPr id="266" name="Google Shape;266;p22"/>
           <p:cNvSpPr txBox="1"/>
           <p:nvPr/>
         </p:nvSpPr>
@@ -26974,7 +27847,7 @@
       </p:sp>
       <p:sp>
         <p:nvSpPr>
-          <p:cNvPr id="257" name="Google Shape;257;p21"/>
+          <p:cNvPr id="267" name="Google Shape;267;p22"/>
           <p:cNvSpPr txBox="1"/>
           <p:nvPr/>
         </p:nvSpPr>
@@ -27032,7 +27905,7 @@
       </p:sp>
       <p:sp>
         <p:nvSpPr>
-          <p:cNvPr id="258" name="Google Shape;258;p21"/>
+          <p:cNvPr id="268" name="Google Shape;268;p22"/>
           <p:cNvSpPr txBox="1"/>
           <p:nvPr/>
         </p:nvSpPr>
@@ -27119,7 +27992,7 @@
                                           </p:stCondLst>
                                         </p:cTn>
                                         <p:tgtEl>
-                                          <p:spTgt spid="240"/>
+                                          <p:spTgt spid="250"/>
                                         </p:tgtEl>
                                         <p:attrNameLst>
                                           <p:attrName>style.visibility</p:attrName>
@@ -27164,7 +28037,124 @@
                                           </p:stCondLst>
                                         </p:cTn>
                                         <p:tgtEl>
-                                          <p:spTgt spid="242"/>
+                                          <p:spTgt spid="252"/>
+                                        </p:tgtEl>
+                                        <p:attrNameLst>
+                                          <p:attrName>style.visibility</p:attrName>
+                                        </p:attrNameLst>
+                                      </p:cBhvr>
+                                      <p:to>
+                                        <p:strVal val="visible"/>
+                                      </p:to>
+                                    </p:set>
+                                  </p:childTnLst>
+                                </p:cTn>
+                              </p:par>
+                            </p:childTnLst>
+                          </p:cTn>
+                        </p:par>
+                      </p:childTnLst>
+                    </p:cTn>
+                  </p:par>
+                  <p:par>
+                    <p:cTn fill="hold">
+                      <p:stCondLst>
+                        <p:cond delay="indefinite"/>
+                      </p:stCondLst>
+                      <p:childTnLst>
+                        <p:par>
+                          <p:cTn fill="hold">
+                            <p:stCondLst>
+                              <p:cond delay="0"/>
+                            </p:stCondLst>
+                            <p:childTnLst>
+                              <p:par>
+                                <p:cTn fill="hold" nodeType="clickEffect" presetClass="entr" presetID="1" presetSubtype="0">
+                                  <p:stCondLst>
+                                    <p:cond delay="0"/>
+                                  </p:stCondLst>
+                                  <p:childTnLst>
+                                    <p:set>
+                                      <p:cBhvr>
+                                        <p:cTn dur="1" fill="hold">
+                                          <p:stCondLst>
+                                            <p:cond delay="0"/>
+                                          </p:stCondLst>
+                                        </p:cTn>
+                                        <p:tgtEl>
+                                          <p:spTgt spid="266"/>
+                                        </p:tgtEl>
+                                        <p:attrNameLst>
+                                          <p:attrName>style.visibility</p:attrName>
+                                        </p:attrNameLst>
+                                      </p:cBhvr>
+                                      <p:to>
+                                        <p:strVal val="visible"/>
+                                      </p:to>
+                                    </p:set>
+                                  </p:childTnLst>
+                                </p:cTn>
+                              </p:par>
+                              <p:par>
+                                <p:cTn fill="hold" nodeType="withEffect" presetClass="entr" presetID="1" presetSubtype="0">
+                                  <p:stCondLst>
+                                    <p:cond delay="0"/>
+                                  </p:stCondLst>
+                                  <p:childTnLst>
+                                    <p:set>
+                                      <p:cBhvr>
+                                        <p:cTn dur="1" fill="hold">
+                                          <p:stCondLst>
+                                            <p:cond delay="0"/>
+                                          </p:stCondLst>
+                                        </p:cTn>
+                                        <p:tgtEl>
+                                          <p:spTgt spid="268"/>
+                                        </p:tgtEl>
+                                        <p:attrNameLst>
+                                          <p:attrName>style.visibility</p:attrName>
+                                        </p:attrNameLst>
+                                      </p:cBhvr>
+                                      <p:to>
+                                        <p:strVal val="visible"/>
+                                      </p:to>
+                                    </p:set>
+                                  </p:childTnLst>
+                                </p:cTn>
+                              </p:par>
+                            </p:childTnLst>
+                          </p:cTn>
+                        </p:par>
+                      </p:childTnLst>
+                    </p:cTn>
+                  </p:par>
+                  <p:par>
+                    <p:cTn fill="hold">
+                      <p:stCondLst>
+                        <p:cond delay="indefinite"/>
+                      </p:stCondLst>
+                      <p:childTnLst>
+                        <p:par>
+                          <p:cTn fill="hold">
+                            <p:stCondLst>
+                              <p:cond delay="0"/>
+                            </p:stCondLst>
+                            <p:childTnLst>
+                              <p:par>
+                                <p:cTn fill="hold" nodeType="clickEffect" presetClass="entr" presetID="1" presetSubtype="0">
+                                  <p:stCondLst>
+                                    <p:cond delay="0"/>
+                                  </p:stCondLst>
+                                  <p:childTnLst>
+                                    <p:set>
+                                      <p:cBhvr>
+                                        <p:cTn dur="1" fill="hold">
+                                          <p:stCondLst>
+                                            <p:cond delay="0"/>
+                                          </p:stCondLst>
+                                        </p:cTn>
+                                        <p:tgtEl>
+                                          <p:spTgt spid="251"/>
                                         </p:tgtEl>
                                         <p:attrNameLst>
                                           <p:attrName>style.visibility</p:attrName>
@@ -27222,33 +28212,6 @@
                                   </p:childTnLst>
                                 </p:cTn>
                               </p:par>
-                              <p:par>
-                                <p:cTn fill="hold" nodeType="withEffect" presetClass="entr" presetID="1" presetSubtype="0">
-                                  <p:stCondLst>
-                                    <p:cond delay="0"/>
-                                  </p:stCondLst>
-                                  <p:childTnLst>
-                                    <p:set>
-                                      <p:cBhvr>
-                                        <p:cTn dur="1" fill="hold">
-                                          <p:stCondLst>
-                                            <p:cond delay="0"/>
-                                          </p:stCondLst>
-                                        </p:cTn>
-                                        <p:tgtEl>
-                                          <p:spTgt spid="258"/>
-                                        </p:tgtEl>
-                                        <p:attrNameLst>
-                                          <p:attrName>style.visibility</p:attrName>
-                                        </p:attrNameLst>
-                                      </p:cBhvr>
-                                      <p:to>
-                                        <p:strVal val="visible"/>
-                                      </p:to>
-                                    </p:set>
-                                  </p:childTnLst>
-                                </p:cTn>
-                              </p:par>
                             </p:childTnLst>
                           </p:cTn>
                         </p:par>
@@ -27281,97 +28244,7 @@
                                           </p:stCondLst>
                                         </p:cTn>
                                         <p:tgtEl>
-                                          <p:spTgt spid="241"/>
-                                        </p:tgtEl>
-                                        <p:attrNameLst>
-                                          <p:attrName>style.visibility</p:attrName>
-                                        </p:attrNameLst>
-                                      </p:cBhvr>
-                                      <p:to>
-                                        <p:strVal val="visible"/>
-                                      </p:to>
-                                    </p:set>
-                                  </p:childTnLst>
-                                </p:cTn>
-                              </p:par>
-                            </p:childTnLst>
-                          </p:cTn>
-                        </p:par>
-                      </p:childTnLst>
-                    </p:cTn>
-                  </p:par>
-                  <p:par>
-                    <p:cTn fill="hold">
-                      <p:stCondLst>
-                        <p:cond delay="indefinite"/>
-                      </p:stCondLst>
-                      <p:childTnLst>
-                        <p:par>
-                          <p:cTn fill="hold">
-                            <p:stCondLst>
-                              <p:cond delay="0"/>
-                            </p:stCondLst>
-                            <p:childTnLst>
-                              <p:par>
-                                <p:cTn fill="hold" nodeType="clickEffect" presetClass="entr" presetID="1" presetSubtype="0">
-                                  <p:stCondLst>
-                                    <p:cond delay="0"/>
-                                  </p:stCondLst>
-                                  <p:childTnLst>
-                                    <p:set>
-                                      <p:cBhvr>
-                                        <p:cTn dur="1" fill="hold">
-                                          <p:stCondLst>
-                                            <p:cond delay="0"/>
-                                          </p:stCondLst>
-                                        </p:cTn>
-                                        <p:tgtEl>
-                                          <p:spTgt spid="246"/>
-                                        </p:tgtEl>
-                                        <p:attrNameLst>
-                                          <p:attrName>style.visibility</p:attrName>
-                                        </p:attrNameLst>
-                                      </p:cBhvr>
-                                      <p:to>
-                                        <p:strVal val="visible"/>
-                                      </p:to>
-                                    </p:set>
-                                  </p:childTnLst>
-                                </p:cTn>
-                              </p:par>
-                            </p:childTnLst>
-                          </p:cTn>
-                        </p:par>
-                      </p:childTnLst>
-                    </p:cTn>
-                  </p:par>
-                  <p:par>
-                    <p:cTn fill="hold">
-                      <p:stCondLst>
-                        <p:cond delay="indefinite"/>
-                      </p:stCondLst>
-                      <p:childTnLst>
-                        <p:par>
-                          <p:cTn fill="hold">
-                            <p:stCondLst>
-                              <p:cond delay="0"/>
-                            </p:stCondLst>
-                            <p:childTnLst>
-                              <p:par>
-                                <p:cTn fill="hold" nodeType="clickEffect" presetClass="entr" presetID="1" presetSubtype="0">
-                                  <p:stCondLst>
-                                    <p:cond delay="0"/>
-                                  </p:stCondLst>
-                                  <p:childTnLst>
-                                    <p:set>
-                                      <p:cBhvr>
-                                        <p:cTn dur="1" fill="hold">
-                                          <p:stCondLst>
-                                            <p:cond delay="0"/>
-                                          </p:stCondLst>
-                                        </p:cTn>
-                                        <p:tgtEl>
-                                          <p:spTgt spid="257"/>
+                                          <p:spTgt spid="267"/>
                                         </p:tgtEl>
                                         <p:attrNameLst>
                                           <p:attrName>style.visibility</p:attrName>

</xml_diff>